<commit_message>
Update files with small changes
</commit_message>
<xml_diff>
--- a/Movie Production Recommendations for Microsoft StudiosV2.pptx
+++ b/Movie Production Recommendations for Microsoft StudiosV2.pptx
@@ -5,7 +5,7 @@
     <p:sldMasterId id="2147484138" r:id="rId1"/>
   </p:sldMasterIdLst>
   <p:notesMasterIdLst>
-    <p:notesMasterId r:id="rId15"/>
+    <p:notesMasterId r:id="rId17"/>
   </p:notesMasterIdLst>
   <p:sldIdLst>
     <p:sldId id="256" r:id="rId2"/>
@@ -17,10 +17,12 @@
     <p:sldId id="267" r:id="rId8"/>
     <p:sldId id="262" r:id="rId9"/>
     <p:sldId id="271" r:id="rId10"/>
-    <p:sldId id="272" r:id="rId11"/>
-    <p:sldId id="268" r:id="rId12"/>
-    <p:sldId id="269" r:id="rId13"/>
-    <p:sldId id="270" r:id="rId14"/>
+    <p:sldId id="274" r:id="rId11"/>
+    <p:sldId id="275" r:id="rId12"/>
+    <p:sldId id="268" r:id="rId13"/>
+    <p:sldId id="269" r:id="rId14"/>
+    <p:sldId id="276" r:id="rId15"/>
+    <p:sldId id="270" r:id="rId16"/>
   </p:sldIdLst>
   <p:sldSz cx="12192000" cy="6858000"/>
   <p:notesSz cx="6858000" cy="9144000"/>
@@ -221,7 +223,7 @@
           <a:p>
             <a:fld id="{7896AFA5-D3B7-4120-AEF6-F5AA9B119411}" type="datetimeFigureOut">
               <a:rPr lang="en-US" smtClean="0"/>
-              <a:t>9/16/2021</a:t>
+              <a:t>9/17/2021</a:t>
             </a:fld>
             <a:endParaRPr lang="en-US"/>
           </a:p>
@@ -621,7 +623,7 @@
           <a:p>
             <a:r>
               <a:rPr lang="en-US" dirty="0"/>
-              <a:t>Jen </a:t>
+              <a:t>Jen</a:t>
             </a:r>
           </a:p>
         </p:txBody>
@@ -652,7 +654,181 @@
     </p:spTree>
     <p:extLst>
       <p:ext uri="{BB962C8B-B14F-4D97-AF65-F5344CB8AC3E}">
+        <p14:creationId xmlns:p14="http://schemas.microsoft.com/office/powerpoint/2010/main" val="1493388559"/>
+      </p:ext>
+    </p:extLst>
+  </p:cSld>
+  <p:clrMapOvr>
+    <a:masterClrMapping/>
+  </p:clrMapOvr>
+</p:notes>
+</file>
+
+<file path=ppt/notesSlides/notesSlide11.xml><?xml version="1.0" encoding="utf-8"?>
+<p:notes xmlns:a="http://schemas.openxmlformats.org/drawingml/2006/main" xmlns:r="http://schemas.openxmlformats.org/officeDocument/2006/relationships" xmlns:p="http://schemas.openxmlformats.org/presentationml/2006/main">
+  <p:cSld>
+    <p:spTree>
+      <p:nvGrpSpPr>
+        <p:cNvPr id="1" name=""/>
+        <p:cNvGrpSpPr/>
+        <p:nvPr/>
+      </p:nvGrpSpPr>
+      <p:grpSpPr>
+        <a:xfrm>
+          <a:off x="0" y="0"/>
+          <a:ext cx="0" cy="0"/>
+          <a:chOff x="0" y="0"/>
+          <a:chExt cx="0" cy="0"/>
+        </a:xfrm>
+      </p:grpSpPr>
+      <p:sp>
+        <p:nvSpPr>
+          <p:cNvPr id="2" name="Slide Image Placeholder 1"/>
+          <p:cNvSpPr>
+            <a:spLocks noGrp="1" noRot="1" noChangeAspect="1"/>
+          </p:cNvSpPr>
+          <p:nvPr>
+            <p:ph type="sldImg"/>
+          </p:nvPr>
+        </p:nvSpPr>
+        <p:spPr/>
+      </p:sp>
+      <p:sp>
+        <p:nvSpPr>
+          <p:cNvPr id="3" name="Notes Placeholder 2"/>
+          <p:cNvSpPr>
+            <a:spLocks noGrp="1"/>
+          </p:cNvSpPr>
+          <p:nvPr>
+            <p:ph type="body" idx="1"/>
+          </p:nvPr>
+        </p:nvSpPr>
+        <p:spPr/>
+        <p:txBody>
+          <a:bodyPr/>
+          <a:lstStyle/>
+          <a:p>
+            <a:r>
+              <a:rPr lang="en-US" dirty="0"/>
+              <a:t>Jen </a:t>
+            </a:r>
+          </a:p>
+        </p:txBody>
+      </p:sp>
+      <p:sp>
+        <p:nvSpPr>
+          <p:cNvPr id="4" name="Slide Number Placeholder 3"/>
+          <p:cNvSpPr>
+            <a:spLocks noGrp="1"/>
+          </p:cNvSpPr>
+          <p:nvPr>
+            <p:ph type="sldNum" sz="quarter" idx="5"/>
+          </p:nvPr>
+        </p:nvSpPr>
+        <p:spPr/>
+        <p:txBody>
+          <a:bodyPr/>
+          <a:lstStyle/>
+          <a:p>
+            <a:fld id="{DA04E698-25C4-4D3B-B97F-264E8A6F84C1}" type="slidenum">
+              <a:rPr lang="en-US" smtClean="0"/>
+              <a:t>12</a:t>
+            </a:fld>
+            <a:endParaRPr lang="en-US"/>
+          </a:p>
+        </p:txBody>
+      </p:sp>
+    </p:spTree>
+    <p:extLst>
+      <p:ext uri="{BB962C8B-B14F-4D97-AF65-F5344CB8AC3E}">
         <p14:creationId xmlns:p14="http://schemas.microsoft.com/office/powerpoint/2010/main" val="1216883502"/>
+      </p:ext>
+    </p:extLst>
+  </p:cSld>
+  <p:clrMapOvr>
+    <a:masterClrMapping/>
+  </p:clrMapOvr>
+</p:notes>
+</file>
+
+<file path=ppt/notesSlides/notesSlide12.xml><?xml version="1.0" encoding="utf-8"?>
+<p:notes xmlns:a="http://schemas.openxmlformats.org/drawingml/2006/main" xmlns:r="http://schemas.openxmlformats.org/officeDocument/2006/relationships" xmlns:p="http://schemas.openxmlformats.org/presentationml/2006/main">
+  <p:cSld>
+    <p:spTree>
+      <p:nvGrpSpPr>
+        <p:cNvPr id="1" name=""/>
+        <p:cNvGrpSpPr/>
+        <p:nvPr/>
+      </p:nvGrpSpPr>
+      <p:grpSpPr>
+        <a:xfrm>
+          <a:off x="0" y="0"/>
+          <a:ext cx="0" cy="0"/>
+          <a:chOff x="0" y="0"/>
+          <a:chExt cx="0" cy="0"/>
+        </a:xfrm>
+      </p:grpSpPr>
+      <p:sp>
+        <p:nvSpPr>
+          <p:cNvPr id="2" name="Slide Image Placeholder 1"/>
+          <p:cNvSpPr>
+            <a:spLocks noGrp="1" noRot="1" noChangeAspect="1"/>
+          </p:cNvSpPr>
+          <p:nvPr>
+            <p:ph type="sldImg"/>
+          </p:nvPr>
+        </p:nvSpPr>
+        <p:spPr/>
+      </p:sp>
+      <p:sp>
+        <p:nvSpPr>
+          <p:cNvPr id="3" name="Notes Placeholder 2"/>
+          <p:cNvSpPr>
+            <a:spLocks noGrp="1"/>
+          </p:cNvSpPr>
+          <p:nvPr>
+            <p:ph type="body" idx="1"/>
+          </p:nvPr>
+        </p:nvSpPr>
+        <p:spPr/>
+        <p:txBody>
+          <a:bodyPr/>
+          <a:lstStyle/>
+          <a:p>
+            <a:r>
+              <a:rPr lang="en-US" dirty="0"/>
+              <a:t>Jen </a:t>
+            </a:r>
+          </a:p>
+        </p:txBody>
+      </p:sp>
+      <p:sp>
+        <p:nvSpPr>
+          <p:cNvPr id="4" name="Slide Number Placeholder 3"/>
+          <p:cNvSpPr>
+            <a:spLocks noGrp="1"/>
+          </p:cNvSpPr>
+          <p:nvPr>
+            <p:ph type="sldNum" sz="quarter" idx="5"/>
+          </p:nvPr>
+        </p:nvSpPr>
+        <p:spPr/>
+        <p:txBody>
+          <a:bodyPr/>
+          <a:lstStyle/>
+          <a:p>
+            <a:fld id="{DA04E698-25C4-4D3B-B97F-264E8A6F84C1}" type="slidenum">
+              <a:rPr lang="en-US" smtClean="0"/>
+              <a:t>14</a:t>
+            </a:fld>
+            <a:endParaRPr lang="en-US"/>
+          </a:p>
+        </p:txBody>
+      </p:sp>
+    </p:spTree>
+    <p:extLst>
+      <p:ext uri="{BB962C8B-B14F-4D97-AF65-F5344CB8AC3E}">
+        <p14:creationId xmlns:p14="http://schemas.microsoft.com/office/powerpoint/2010/main" val="3708032073"/>
       </p:ext>
     </p:extLst>
   </p:cSld>
@@ -1314,7 +1490,7 @@
           <a:p>
             <a:r>
               <a:rPr lang="en-US" dirty="0"/>
-              <a:t>Alex </a:t>
+              <a:t>Jen</a:t>
             </a:r>
           </a:p>
         </p:txBody>
@@ -1345,7 +1521,7 @@
     </p:spTree>
     <p:extLst>
       <p:ext uri="{BB962C8B-B14F-4D97-AF65-F5344CB8AC3E}">
-        <p14:creationId xmlns:p14="http://schemas.microsoft.com/office/powerpoint/2010/main" val="2722408719"/>
+        <p14:creationId xmlns:p14="http://schemas.microsoft.com/office/powerpoint/2010/main" val="4212943283"/>
       </p:ext>
     </p:extLst>
   </p:cSld>
@@ -1629,7 +1805,7 @@
           <a:p>
             <a:fld id="{733C3EBA-BE82-41A8-8CC6-4166588B2332}" type="datetimeFigureOut">
               <a:rPr lang="en-US" smtClean="0"/>
-              <a:t>9/16/2021</a:t>
+              <a:t>9/17/2021</a:t>
             </a:fld>
             <a:endParaRPr lang="en-US"/>
           </a:p>
@@ -2043,7 +2219,7 @@
           <a:p>
             <a:fld id="{733C3EBA-BE82-41A8-8CC6-4166588B2332}" type="datetimeFigureOut">
               <a:rPr lang="en-US" smtClean="0"/>
-              <a:t>9/16/2021</a:t>
+              <a:t>9/17/2021</a:t>
             </a:fld>
             <a:endParaRPr lang="en-US"/>
           </a:p>
@@ -2379,7 +2555,7 @@
           <a:p>
             <a:fld id="{733C3EBA-BE82-41A8-8CC6-4166588B2332}" type="datetimeFigureOut">
               <a:rPr lang="en-US" smtClean="0"/>
-              <a:t>9/16/2021</a:t>
+              <a:t>9/17/2021</a:t>
             </a:fld>
             <a:endParaRPr lang="en-US"/>
           </a:p>
@@ -2784,7 +2960,7 @@
           <a:p>
             <a:fld id="{733C3EBA-BE82-41A8-8CC6-4166588B2332}" type="datetimeFigureOut">
               <a:rPr lang="en-US" smtClean="0"/>
-              <a:t>9/16/2021</a:t>
+              <a:t>9/17/2021</a:t>
             </a:fld>
             <a:endParaRPr lang="en-US"/>
           </a:p>
@@ -3352,7 +3528,7 @@
           <a:p>
             <a:fld id="{733C3EBA-BE82-41A8-8CC6-4166588B2332}" type="datetimeFigureOut">
               <a:rPr lang="en-US" smtClean="0"/>
-              <a:t>9/16/2021</a:t>
+              <a:t>9/17/2021</a:t>
             </a:fld>
             <a:endParaRPr lang="en-US"/>
           </a:p>
@@ -4033,7 +4209,7 @@
           <a:p>
             <a:fld id="{733C3EBA-BE82-41A8-8CC6-4166588B2332}" type="datetimeFigureOut">
               <a:rPr lang="en-US" smtClean="0"/>
-              <a:t>9/16/2021</a:t>
+              <a:t>9/17/2021</a:t>
             </a:fld>
             <a:endParaRPr lang="en-US"/>
           </a:p>
@@ -4946,7 +5122,7 @@
           <a:p>
             <a:fld id="{733C3EBA-BE82-41A8-8CC6-4166588B2332}" type="datetimeFigureOut">
               <a:rPr lang="en-US" smtClean="0"/>
-              <a:t>9/16/2021</a:t>
+              <a:t>9/17/2021</a:t>
             </a:fld>
             <a:endParaRPr lang="en-US"/>
           </a:p>
@@ -5259,7 +5435,7 @@
           <a:p>
             <a:fld id="{733C3EBA-BE82-41A8-8CC6-4166588B2332}" type="datetimeFigureOut">
               <a:rPr lang="en-US" smtClean="0"/>
-              <a:t>9/16/2021</a:t>
+              <a:t>9/17/2021</a:t>
             </a:fld>
             <a:endParaRPr lang="en-US"/>
           </a:p>
@@ -5523,7 +5699,7 @@
           <a:p>
             <a:fld id="{733C3EBA-BE82-41A8-8CC6-4166588B2332}" type="datetimeFigureOut">
               <a:rPr lang="en-US" smtClean="0"/>
-              <a:t>9/16/2021</a:t>
+              <a:t>9/17/2021</a:t>
             </a:fld>
             <a:endParaRPr lang="en-US"/>
           </a:p>
@@ -5846,7 +6022,7 @@
           <a:p>
             <a:fld id="{733C3EBA-BE82-41A8-8CC6-4166588B2332}" type="datetimeFigureOut">
               <a:rPr lang="en-US" smtClean="0"/>
-              <a:t>9/16/2021</a:t>
+              <a:t>9/17/2021</a:t>
             </a:fld>
             <a:endParaRPr lang="en-US"/>
           </a:p>
@@ -6235,7 +6411,7 @@
           <a:p>
             <a:fld id="{733C3EBA-BE82-41A8-8CC6-4166588B2332}" type="datetimeFigureOut">
               <a:rPr lang="en-US" smtClean="0"/>
-              <a:t>9/16/2021</a:t>
+              <a:t>9/17/2021</a:t>
             </a:fld>
             <a:endParaRPr lang="en-US"/>
           </a:p>
@@ -6611,7 +6787,7 @@
           <a:p>
             <a:fld id="{733C3EBA-BE82-41A8-8CC6-4166588B2332}" type="datetimeFigureOut">
               <a:rPr lang="en-US" smtClean="0"/>
-              <a:t>9/16/2021</a:t>
+              <a:t>9/17/2021</a:t>
             </a:fld>
             <a:endParaRPr lang="en-US"/>
           </a:p>
@@ -7117,7 +7293,7 @@
           <a:p>
             <a:fld id="{733C3EBA-BE82-41A8-8CC6-4166588B2332}" type="datetimeFigureOut">
               <a:rPr lang="en-US" smtClean="0"/>
-              <a:t>9/16/2021</a:t>
+              <a:t>9/17/2021</a:t>
             </a:fld>
             <a:endParaRPr lang="en-US"/>
           </a:p>
@@ -7374,7 +7550,7 @@
           <a:p>
             <a:fld id="{733C3EBA-BE82-41A8-8CC6-4166588B2332}" type="datetimeFigureOut">
               <a:rPr lang="en-US" smtClean="0"/>
-              <a:t>9/16/2021</a:t>
+              <a:t>9/17/2021</a:t>
             </a:fld>
             <a:endParaRPr lang="en-US"/>
           </a:p>
@@ -7537,7 +7713,7 @@
           <a:p>
             <a:fld id="{733C3EBA-BE82-41A8-8CC6-4166588B2332}" type="datetimeFigureOut">
               <a:rPr lang="en-US" smtClean="0"/>
-              <a:t>9/16/2021</a:t>
+              <a:t>9/17/2021</a:t>
             </a:fld>
             <a:endParaRPr lang="en-US"/>
           </a:p>
@@ -7927,7 +8103,7 @@
           <a:p>
             <a:fld id="{733C3EBA-BE82-41A8-8CC6-4166588B2332}" type="datetimeFigureOut">
               <a:rPr lang="en-US" smtClean="0"/>
-              <a:t>9/16/2021</a:t>
+              <a:t>9/17/2021</a:t>
             </a:fld>
             <a:endParaRPr lang="en-US"/>
           </a:p>
@@ -8336,7 +8512,7 @@
           <a:p>
             <a:fld id="{733C3EBA-BE82-41A8-8CC6-4166588B2332}" type="datetimeFigureOut">
               <a:rPr lang="en-US" smtClean="0"/>
-              <a:t>9/16/2021</a:t>
+              <a:t>9/17/2021</a:t>
             </a:fld>
             <a:endParaRPr lang="en-US"/>
           </a:p>
@@ -8580,7 +8756,7 @@
           <a:p>
             <a:fld id="{733C3EBA-BE82-41A8-8CC6-4166588B2332}" type="datetimeFigureOut">
               <a:rPr lang="en-US" smtClean="0"/>
-              <a:t>9/16/2021</a:t>
+              <a:t>9/17/2021</a:t>
             </a:fld>
             <a:endParaRPr lang="en-US"/>
           </a:p>
@@ -9498,21 +9674,21 @@
           <a:chExt cx="0" cy="0"/>
         </a:xfrm>
       </p:grpSpPr>
-      <p:pic>
-        <p:nvPicPr>
-          <p:cNvPr id="80" name="Picture 79">
+      <p:sp useBgFill="1">
+        <p:nvSpPr>
+          <p:cNvPr id="11" name="Rectangle 10">
             <a:extLst>
               <a:ext uri="{FF2B5EF4-FFF2-40B4-BE49-F238E27FC236}">
-                <a16:creationId xmlns:a16="http://schemas.microsoft.com/office/drawing/2014/main" id="{A97529DD-0019-4F2B-AAE6-A82A2FADB61C}"/>
+                <a16:creationId xmlns:a16="http://schemas.microsoft.com/office/drawing/2014/main" id="{8DCA3673-CDE4-40C5-9FA8-F89874CFBA73}"/>
               </a:ext>
               <a:ext uri="{C183D7F6-B498-43B3-948B-1728B52AA6E4}">
                 <adec:decorative xmlns:adec="http://schemas.microsoft.com/office/drawing/2017/decorative" val="1"/>
               </a:ext>
             </a:extLst>
           </p:cNvPr>
-          <p:cNvPicPr>
-            <a:picLocks noGrp="1" noRot="1" noChangeAspect="1" noMove="1" noResize="1" noEditPoints="1" noAdjustHandles="1" noChangeArrowheads="1" noChangeShapeType="1" noCrop="1"/>
-          </p:cNvPicPr>
+          <p:cNvSpPr>
+            <a:spLocks noGrp="1" noRot="1" noChangeAspect="1" noMove="1" noResize="1" noEditPoints="1" noAdjustHandles="1" noChangeArrowheads="1" noChangeShapeType="1" noTextEdit="1"/>
+          </p:cNvSpPr>
           <p:nvPr>
             <p:extLst>
               <p:ext uri="{386F3935-93C4-4BCD-93E2-E3B085C9AB24}">
@@ -9520,160 +9696,15 @@
               </p:ext>
             </p:extLst>
           </p:nvPr>
-        </p:nvPicPr>
-        <p:blipFill>
-          <a:blip r:embed="rId3">
-            <a:alphaModFix amt="10000"/>
-            <a:extLst>
-              <a:ext uri="{28A0092B-C50C-407E-A947-70E740481C1C}">
-                <a14:useLocalDpi xmlns:a14="http://schemas.microsoft.com/office/drawing/2010/main" val="0"/>
-              </a:ext>
-            </a:extLst>
-          </a:blip>
-          <a:stretch>
-            <a:fillRect/>
-          </a:stretch>
-        </p:blipFill>
-        <p:spPr>
-          <a:xfrm>
-            <a:off x="0" y="0"/>
-            <a:ext cx="12192000" cy="6858000"/>
+        </p:nvSpPr>
+        <p:spPr>
+          <a:xfrm>
+            <a:off x="0" y="-1"/>
+            <a:ext cx="12188824" cy="6858001"/>
           </a:xfrm>
           <a:prstGeom prst="rect">
             <a:avLst/>
           </a:prstGeom>
-        </p:spPr>
-      </p:pic>
-      <p:pic>
-        <p:nvPicPr>
-          <p:cNvPr id="82" name="Picture 81">
-            <a:extLst>
-              <a:ext uri="{FF2B5EF4-FFF2-40B4-BE49-F238E27FC236}">
-                <a16:creationId xmlns:a16="http://schemas.microsoft.com/office/drawing/2014/main" id="{F4B5AAB9-9C0B-4191-9D8C-E92806CC2609}"/>
-              </a:ext>
-              <a:ext uri="{C183D7F6-B498-43B3-948B-1728B52AA6E4}">
-                <adec:decorative xmlns:adec="http://schemas.microsoft.com/office/drawing/2017/decorative" val="1"/>
-              </a:ext>
-            </a:extLst>
-          </p:cNvPr>
-          <p:cNvPicPr>
-            <a:picLocks noGrp="1" noRot="1" noChangeAspect="1" noMove="1" noResize="1" noEditPoints="1" noAdjustHandles="1" noChangeArrowheads="1" noChangeShapeType="1" noCrop="1"/>
-          </p:cNvPicPr>
-          <p:nvPr>
-            <p:extLst>
-              <p:ext uri="{386F3935-93C4-4BCD-93E2-E3B085C9AB24}">
-                <p16:designElem xmlns:p16="http://schemas.microsoft.com/office/powerpoint/2015/main" val="1"/>
-              </p:ext>
-            </p:extLst>
-          </p:nvPr>
-        </p:nvPicPr>
-        <p:blipFill>
-          <a:blip r:embed="rId4">
-            <a:extLst>
-              <a:ext uri="{28A0092B-C50C-407E-A947-70E740481C1C}">
-                <a14:useLocalDpi xmlns:a14="http://schemas.microsoft.com/office/drawing/2010/main" val="0"/>
-              </a:ext>
-            </a:extLst>
-          </a:blip>
-          <a:stretch>
-            <a:fillRect/>
-          </a:stretch>
-        </p:blipFill>
-        <p:spPr>
-          <a:xfrm>
-            <a:off x="1" y="4242851"/>
-            <a:ext cx="8968084" cy="275942"/>
-          </a:xfrm>
-          <a:prstGeom prst="rect">
-            <a:avLst/>
-          </a:prstGeom>
-        </p:spPr>
-      </p:pic>
-      <p:pic>
-        <p:nvPicPr>
-          <p:cNvPr id="84" name="Picture 83">
-            <a:extLst>
-              <a:ext uri="{FF2B5EF4-FFF2-40B4-BE49-F238E27FC236}">
-                <a16:creationId xmlns:a16="http://schemas.microsoft.com/office/drawing/2014/main" id="{07B0D32C-9323-4E07-8AE3-7AFF93348110}"/>
-              </a:ext>
-              <a:ext uri="{C183D7F6-B498-43B3-948B-1728B52AA6E4}">
-                <adec:decorative xmlns:adec="http://schemas.microsoft.com/office/drawing/2017/decorative" val="1"/>
-              </a:ext>
-            </a:extLst>
-          </p:cNvPr>
-          <p:cNvPicPr>
-            <a:picLocks noGrp="1" noRot="1" noChangeAspect="1" noMove="1" noResize="1" noEditPoints="1" noAdjustHandles="1" noChangeArrowheads="1" noChangeShapeType="1" noCrop="1"/>
-          </p:cNvPicPr>
-          <p:nvPr>
-            <p:extLst>
-              <p:ext uri="{386F3935-93C4-4BCD-93E2-E3B085C9AB24}">
-                <p16:designElem xmlns:p16="http://schemas.microsoft.com/office/powerpoint/2015/main" val="1"/>
-              </p:ext>
-            </p:extLst>
-          </p:nvPr>
-        </p:nvPicPr>
-        <p:blipFill>
-          <a:blip r:embed="rId5">
-            <a:extLst>
-              <a:ext uri="{28A0092B-C50C-407E-A947-70E740481C1C}">
-                <a14:useLocalDpi xmlns:a14="http://schemas.microsoft.com/office/drawing/2010/main" val="0"/>
-              </a:ext>
-            </a:extLst>
-          </a:blip>
-          <a:stretch>
-            <a:fillRect/>
-          </a:stretch>
-        </p:blipFill>
-        <p:spPr>
-          <a:xfrm>
-            <a:off x="9111716" y="4243845"/>
-            <a:ext cx="3077108" cy="276940"/>
-          </a:xfrm>
-          <a:prstGeom prst="rect">
-            <a:avLst/>
-          </a:prstGeom>
-        </p:spPr>
-      </p:pic>
-      <p:sp>
-        <p:nvSpPr>
-          <p:cNvPr id="86" name="Rectangle 85">
-            <a:extLst>
-              <a:ext uri="{FF2B5EF4-FFF2-40B4-BE49-F238E27FC236}">
-                <a16:creationId xmlns:a16="http://schemas.microsoft.com/office/drawing/2014/main" id="{CE97D32F-1315-4522-AF1E-BCA3A653F2F3}"/>
-              </a:ext>
-              <a:ext uri="{C183D7F6-B498-43B3-948B-1728B52AA6E4}">
-                <adec:decorative xmlns:adec="http://schemas.microsoft.com/office/drawing/2017/decorative" val="1"/>
-              </a:ext>
-            </a:extLst>
-          </p:cNvPr>
-          <p:cNvSpPr>
-            <a:spLocks noGrp="1" noRot="1" noChangeAspect="1" noMove="1" noResize="1" noEditPoints="1" noAdjustHandles="1" noChangeArrowheads="1" noChangeShapeType="1" noTextEdit="1"/>
-          </p:cNvSpPr>
-          <p:nvPr>
-            <p:extLst>
-              <p:ext uri="{386F3935-93C4-4BCD-93E2-E3B085C9AB24}">
-                <p16:designElem xmlns:p16="http://schemas.microsoft.com/office/powerpoint/2015/main" val="1"/>
-              </p:ext>
-            </p:extLst>
-          </p:nvPr>
-        </p:nvSpPr>
-        <p:spPr>
-          <a:xfrm>
-            <a:off x="0" y="2590078"/>
-            <a:ext cx="8968085" cy="1660332"/>
-          </a:xfrm>
-          <a:prstGeom prst="rect">
-            <a:avLst/>
-          </a:prstGeom>
-          <a:solidFill>
-            <a:schemeClr val="bg1">
-              <a:lumMod val="85000"/>
-              <a:lumOff val="15000"/>
-            </a:schemeClr>
-          </a:solidFill>
-          <a:ln>
-            <a:noFill/>
-          </a:ln>
         </p:spPr>
         <p:style>
           <a:lnRef idx="2">
@@ -9691,22 +9722,30 @@
             <a:schemeClr val="lt1"/>
           </a:fontRef>
         </p:style>
-      </p:sp>
-      <p:sp>
-        <p:nvSpPr>
-          <p:cNvPr id="88" name="Rectangle 87">
+        <p:txBody>
+          <a:bodyPr rtlCol="0" anchor="ctr"/>
+          <a:lstStyle/>
+          <a:p>
+            <a:pPr algn="ctr"/>
+            <a:endParaRPr lang="en-US"/>
+          </a:p>
+        </p:txBody>
+      </p:sp>
+      <p:pic>
+        <p:nvPicPr>
+          <p:cNvPr id="13" name="Picture 12">
             <a:extLst>
               <a:ext uri="{FF2B5EF4-FFF2-40B4-BE49-F238E27FC236}">
-                <a16:creationId xmlns:a16="http://schemas.microsoft.com/office/drawing/2014/main" id="{DE5DADF0-4577-4642-B07A-3E27915F3605}"/>
+                <a16:creationId xmlns:a16="http://schemas.microsoft.com/office/drawing/2014/main" id="{95756E8F-499C-4533-BBE8-309C3E8D985C}"/>
               </a:ext>
               <a:ext uri="{C183D7F6-B498-43B3-948B-1728B52AA6E4}">
                 <adec:decorative xmlns:adec="http://schemas.microsoft.com/office/drawing/2017/decorative" val="1"/>
               </a:ext>
             </a:extLst>
           </p:cNvPr>
-          <p:cNvSpPr>
-            <a:spLocks noGrp="1" noRot="1" noChangeAspect="1" noMove="1" noResize="1" noEditPoints="1" noAdjustHandles="1" noChangeArrowheads="1" noChangeShapeType="1" noTextEdit="1"/>
-          </p:cNvSpPr>
+          <p:cNvPicPr>
+            <a:picLocks noGrp="1" noRot="1" noChangeAspect="1" noMove="1" noResize="1" noEditPoints="1" noAdjustHandles="1" noChangeArrowheads="1" noChangeShapeType="1" noCrop="1"/>
+          </p:cNvPicPr>
           <p:nvPr>
             <p:extLst>
               <p:ext uri="{386F3935-93C4-4BCD-93E2-E3B085C9AB24}">
@@ -9714,18 +9753,61 @@
               </p:ext>
             </p:extLst>
           </p:nvPr>
-        </p:nvSpPr>
-        <p:spPr>
-          <a:xfrm>
-            <a:off x="9111715" y="2590078"/>
-            <a:ext cx="3077109" cy="1660332"/>
+        </p:nvPicPr>
+        <p:blipFill>
+          <a:blip r:embed="rId3">
+            <a:alphaModFix amt="10000"/>
+            <a:extLst>
+              <a:ext uri="{28A0092B-C50C-407E-A947-70E740481C1C}">
+                <a14:useLocalDpi xmlns:a14="http://schemas.microsoft.com/office/drawing/2010/main" val="0"/>
+              </a:ext>
+            </a:extLst>
+          </a:blip>
+          <a:stretch>
+            <a:fillRect/>
+          </a:stretch>
+        </p:blipFill>
+        <p:spPr>
+          <a:xfrm>
+            <a:off x="-3176" y="0"/>
+            <a:ext cx="12192000" cy="6858000"/>
           </a:xfrm>
           <a:prstGeom prst="rect">
             <a:avLst/>
           </a:prstGeom>
-          <a:solidFill>
-            <a:schemeClr val="accent1"/>
-          </a:solidFill>
+        </p:spPr>
+      </p:pic>
+      <p:sp>
+        <p:nvSpPr>
+          <p:cNvPr id="15" name="Rectangle 14">
+            <a:extLst>
+              <a:ext uri="{FF2B5EF4-FFF2-40B4-BE49-F238E27FC236}">
+                <a16:creationId xmlns:a16="http://schemas.microsoft.com/office/drawing/2014/main" id="{0FFFD040-32A9-4D2B-86CA-599D030A4161}"/>
+              </a:ext>
+              <a:ext uri="{C183D7F6-B498-43B3-948B-1728B52AA6E4}">
+                <adec:decorative xmlns:adec="http://schemas.microsoft.com/office/drawing/2017/decorative" val="1"/>
+              </a:ext>
+            </a:extLst>
+          </p:cNvPr>
+          <p:cNvSpPr>
+            <a:spLocks noGrp="1" noRot="1" noChangeAspect="1" noMove="1" noResize="1" noEditPoints="1" noAdjustHandles="1" noChangeArrowheads="1" noChangeShapeType="1" noTextEdit="1"/>
+          </p:cNvSpPr>
+          <p:nvPr>
+            <p:extLst>
+              <p:ext uri="{386F3935-93C4-4BCD-93E2-E3B085C9AB24}">
+                <p16:designElem xmlns:p16="http://schemas.microsoft.com/office/powerpoint/2015/main" val="1"/>
+              </p:ext>
+            </p:extLst>
+          </p:nvPr>
+        </p:nvSpPr>
+        <p:spPr>
+          <a:xfrm>
+            <a:off x="4639056" y="0"/>
+            <a:ext cx="7552944" cy="6858001"/>
+          </a:xfrm>
+          <a:prstGeom prst="rect">
+            <a:avLst/>
+          </a:prstGeom>
           <a:ln>
             <a:noFill/>
           </a:ln>
@@ -9746,22 +9828,30 @@
             <a:schemeClr val="lt1"/>
           </a:fontRef>
         </p:style>
-      </p:sp>
-      <p:grpSp>
-        <p:nvGrpSpPr>
-          <p:cNvPr id="90" name="Group 89">
+        <p:txBody>
+          <a:bodyPr rtlCol="0" anchor="ctr"/>
+          <a:lstStyle/>
+          <a:p>
+            <a:pPr algn="ctr"/>
+            <a:endParaRPr lang="en-US"/>
+          </a:p>
+        </p:txBody>
+      </p:sp>
+      <p:sp>
+        <p:nvSpPr>
+          <p:cNvPr id="17" name="Rectangle 16">
             <a:extLst>
               <a:ext uri="{FF2B5EF4-FFF2-40B4-BE49-F238E27FC236}">
-                <a16:creationId xmlns:a16="http://schemas.microsoft.com/office/drawing/2014/main" id="{5708C51C-BE49-40F0-B3C6-33B579B5A7AA}"/>
+                <a16:creationId xmlns:a16="http://schemas.microsoft.com/office/drawing/2014/main" id="{863205CA-B7FF-4C25-A4C8-3BBBCE19D950}"/>
               </a:ext>
               <a:ext uri="{C183D7F6-B498-43B3-948B-1728B52AA6E4}">
                 <adec:decorative xmlns:adec="http://schemas.microsoft.com/office/drawing/2017/decorative" val="1"/>
               </a:ext>
             </a:extLst>
           </p:cNvPr>
-          <p:cNvGrpSpPr>
-            <a:grpSpLocks noGrp="1" noUngrp="1" noRot="1" noChangeAspect="1" noMove="1" noResize="1"/>
-          </p:cNvGrpSpPr>
+          <p:cNvSpPr>
+            <a:spLocks noGrp="1" noRot="1" noChangeAspect="1" noMove="1" noResize="1" noEditPoints="1" noAdjustHandles="1" noChangeArrowheads="1" noChangeShapeType="1" noTextEdit="1"/>
+          </p:cNvSpPr>
           <p:nvPr>
             <p:extLst>
               <p:ext uri="{386F3935-93C4-4BCD-93E2-E3B085C9AB24}">
@@ -9769,156 +9859,19 @@
               </p:ext>
             </p:extLst>
           </p:nvPr>
-        </p:nvGrpSpPr>
-        <p:grpSpPr>
-          <a:xfrm>
-            <a:off x="-3176" y="0"/>
-            <a:ext cx="12192000" cy="6858001"/>
-            <a:chOff x="-3176" y="0"/>
-            <a:chExt cx="12192000" cy="6858001"/>
-          </a:xfrm>
-        </p:grpSpPr>
-        <p:sp useBgFill="1">
-          <p:nvSpPr>
-            <p:cNvPr id="91" name="Rectangle 90">
-              <a:extLst>
-                <a:ext uri="{FF2B5EF4-FFF2-40B4-BE49-F238E27FC236}">
-                  <a16:creationId xmlns:a16="http://schemas.microsoft.com/office/drawing/2014/main" id="{0F552B4D-E73B-404F-95E2-07E89F33AFC2}"/>
-                </a:ext>
-                <a:ext uri="{C183D7F6-B498-43B3-948B-1728B52AA6E4}">
-                  <adec:decorative xmlns:adec="http://schemas.microsoft.com/office/drawing/2017/decorative" val="1"/>
-                </a:ext>
-              </a:extLst>
-            </p:cNvPr>
-            <p:cNvSpPr/>
-            <p:nvPr>
-              <p:extLst>
-                <p:ext uri="{386F3935-93C4-4BCD-93E2-E3B085C9AB24}">
-                  <p16:designElem xmlns:p16="http://schemas.microsoft.com/office/powerpoint/2015/main" val="1"/>
-                </p:ext>
-              </p:extLst>
-            </p:nvPr>
-          </p:nvSpPr>
-          <p:spPr>
-            <a:xfrm>
-              <a:off x="0" y="0"/>
-              <a:ext cx="12188824" cy="6858001"/>
-            </a:xfrm>
-            <a:prstGeom prst="rect">
-              <a:avLst/>
-            </a:prstGeom>
-            <a:ln>
-              <a:noFill/>
-            </a:ln>
-          </p:spPr>
-          <p:style>
-            <a:lnRef idx="2">
-              <a:schemeClr val="accent1">
-                <a:shade val="50000"/>
-              </a:schemeClr>
-            </a:lnRef>
-            <a:fillRef idx="1">
-              <a:schemeClr val="accent1"/>
-            </a:fillRef>
-            <a:effectRef idx="0">
-              <a:schemeClr val="accent1"/>
-            </a:effectRef>
-            <a:fontRef idx="minor">
-              <a:schemeClr val="lt1"/>
-            </a:fontRef>
-          </p:style>
-          <p:txBody>
-            <a:bodyPr rtlCol="0" anchor="ctr"/>
-            <a:lstStyle/>
-            <a:p>
-              <a:pPr algn="ctr"/>
-              <a:endParaRPr lang="en-US"/>
-            </a:p>
-          </p:txBody>
-        </p:sp>
-        <p:pic>
-          <p:nvPicPr>
-            <p:cNvPr id="92" name="Picture 91">
-              <a:extLst>
-                <a:ext uri="{FF2B5EF4-FFF2-40B4-BE49-F238E27FC236}">
-                  <a16:creationId xmlns:a16="http://schemas.microsoft.com/office/drawing/2014/main" id="{2C40CF95-BD88-4E85-AE5C-BA1A79D205F9}"/>
-                </a:ext>
-                <a:ext uri="{C183D7F6-B498-43B3-948B-1728B52AA6E4}">
-                  <adec:decorative xmlns:adec="http://schemas.microsoft.com/office/drawing/2017/decorative" val="1"/>
-                </a:ext>
-              </a:extLst>
-            </p:cNvPr>
-            <p:cNvPicPr>
-              <a:picLocks noChangeAspect="1"/>
-            </p:cNvPicPr>
-            <p:nvPr>
-              <p:extLst>
-                <p:ext uri="{386F3935-93C4-4BCD-93E2-E3B085C9AB24}">
-                  <p16:designElem xmlns:p16="http://schemas.microsoft.com/office/powerpoint/2015/main" val="1"/>
-                </p:ext>
-              </p:extLst>
-            </p:nvPr>
-          </p:nvPicPr>
-          <p:blipFill>
-            <a:blip r:embed="rId3">
-              <a:alphaModFix amt="10000"/>
-              <a:extLst>
-                <a:ext uri="{28A0092B-C50C-407E-A947-70E740481C1C}">
-                  <a14:useLocalDpi xmlns:a14="http://schemas.microsoft.com/office/drawing/2010/main" val="0"/>
-                </a:ext>
-              </a:extLst>
-            </a:blip>
-            <a:stretch>
-              <a:fillRect/>
-            </a:stretch>
-          </p:blipFill>
-          <p:spPr>
-            <a:xfrm>
-              <a:off x="-3176" y="0"/>
-              <a:ext cx="12192000" cy="6858000"/>
-            </a:xfrm>
-            <a:prstGeom prst="rect">
-              <a:avLst/>
-            </a:prstGeom>
-          </p:spPr>
-        </p:pic>
-      </p:grpSp>
-      <p:sp>
-        <p:nvSpPr>
-          <p:cNvPr id="94" name="Rectangle 93">
-            <a:extLst>
-              <a:ext uri="{FF2B5EF4-FFF2-40B4-BE49-F238E27FC236}">
-                <a16:creationId xmlns:a16="http://schemas.microsoft.com/office/drawing/2014/main" id="{19CF8566-1992-4E2F-AD73-35618121478F}"/>
-              </a:ext>
-              <a:ext uri="{C183D7F6-B498-43B3-948B-1728B52AA6E4}">
-                <adec:decorative xmlns:adec="http://schemas.microsoft.com/office/drawing/2017/decorative" val="1"/>
-              </a:ext>
-            </a:extLst>
-          </p:cNvPr>
-          <p:cNvSpPr>
-            <a:spLocks noGrp="1" noRot="1" noChangeAspect="1" noMove="1" noResize="1" noEditPoints="1" noAdjustHandles="1" noChangeArrowheads="1" noChangeShapeType="1" noTextEdit="1"/>
-          </p:cNvSpPr>
-          <p:nvPr>
-            <p:extLst>
-              <p:ext uri="{386F3935-93C4-4BCD-93E2-E3B085C9AB24}">
-                <p16:designElem xmlns:p16="http://schemas.microsoft.com/office/powerpoint/2015/main" val="1"/>
-              </p:ext>
-            </p:extLst>
-          </p:nvPr>
         </p:nvSpPr>
         <p:spPr bwMode="grayWhite">
           <a:xfrm>
-            <a:off x="0" y="4557357"/>
-            <a:ext cx="8978671" cy="1660332"/>
+            <a:off x="2" y="609600"/>
+            <a:ext cx="4959094" cy="1368198"/>
           </a:xfrm>
           <a:prstGeom prst="rect">
             <a:avLst/>
           </a:prstGeom>
           <a:solidFill>
             <a:schemeClr val="bg1">
-              <a:lumMod val="95000"/>
-              <a:lumOff val="5000"/>
-              <a:alpha val="90000"/>
+              <a:lumMod val="85000"/>
+              <a:lumOff val="15000"/>
             </a:schemeClr>
           </a:solidFill>
           <a:ln>
@@ -9942,95 +9895,21 @@
           </a:fontRef>
         </p:style>
       </p:sp>
-      <p:sp>
-        <p:nvSpPr>
-          <p:cNvPr id="2" name="Title 1">
+      <p:pic>
+        <p:nvPicPr>
+          <p:cNvPr id="19" name="Picture 18">
             <a:extLst>
               <a:ext uri="{FF2B5EF4-FFF2-40B4-BE49-F238E27FC236}">
-                <a16:creationId xmlns:a16="http://schemas.microsoft.com/office/drawing/2014/main" id="{20A0F555-4E55-45E9-AD36-86EB448B2F51}"/>
-              </a:ext>
-            </a:extLst>
-          </p:cNvPr>
-          <p:cNvSpPr>
-            <a:spLocks noGrp="1"/>
-          </p:cNvSpPr>
-          <p:nvPr>
-            <p:ph type="title"/>
-          </p:nvPr>
-        </p:nvSpPr>
-        <p:spPr>
-          <a:xfrm>
-            <a:off x="690908" y="4608883"/>
-            <a:ext cx="8133478" cy="940240"/>
-          </a:xfrm>
-        </p:spPr>
-        <p:txBody>
-          <a:bodyPr vert="horz" lIns="91440" tIns="45720" rIns="91440" bIns="45720" rtlCol="0" anchor="b">
-            <a:normAutofit/>
-          </a:bodyPr>
-          <a:lstStyle/>
-          <a:p>
-            <a:pPr algn="r"/>
-            <a:r>
-              <a:rPr lang="en-US" sz="3200" dirty="0"/>
-              <a:t>Results</a:t>
-            </a:r>
-          </a:p>
-        </p:txBody>
-      </p:sp>
-      <p:sp>
-        <p:nvSpPr>
-          <p:cNvPr id="3" name="Content Placeholder 2">
-            <a:extLst>
-              <a:ext uri="{FF2B5EF4-FFF2-40B4-BE49-F238E27FC236}">
-                <a16:creationId xmlns:a16="http://schemas.microsoft.com/office/drawing/2014/main" id="{60E45E65-0BEF-410A-BD91-FB7ED440CCF3}"/>
-              </a:ext>
-            </a:extLst>
-          </p:cNvPr>
-          <p:cNvSpPr>
-            <a:spLocks noGrp="1"/>
-          </p:cNvSpPr>
-          <p:nvPr>
-            <p:ph idx="1"/>
-          </p:nvPr>
-        </p:nvSpPr>
-        <p:spPr>
-          <a:xfrm>
-            <a:off x="690908" y="5489463"/>
-            <a:ext cx="8133478" cy="406566"/>
-          </a:xfrm>
-        </p:spPr>
-        <p:txBody>
-          <a:bodyPr vert="horz" lIns="91440" tIns="45720" rIns="91440" bIns="45720" rtlCol="0">
-            <a:noAutofit/>
-          </a:bodyPr>
-          <a:lstStyle/>
-          <a:p>
-            <a:pPr marL="0" indent="0" algn="r">
-              <a:buNone/>
-            </a:pPr>
-            <a:r>
-              <a:rPr lang="en-US" dirty="0"/>
-              <a:t>Fewest movies released at the end of the year with another dip in releases over April &amp; May.</a:t>
-            </a:r>
-          </a:p>
-        </p:txBody>
-      </p:sp>
-      <p:sp>
-        <p:nvSpPr>
-          <p:cNvPr id="96" name="Rectangle 95">
-            <a:extLst>
-              <a:ext uri="{FF2B5EF4-FFF2-40B4-BE49-F238E27FC236}">
-                <a16:creationId xmlns:a16="http://schemas.microsoft.com/office/drawing/2014/main" id="{89CC8083-ABEB-41E0-B4DD-138CDA9C3240}"/>
+                <a16:creationId xmlns:a16="http://schemas.microsoft.com/office/drawing/2014/main" id="{306E3F32-3C1A-4B6E-AF26-8A15A788560F}"/>
               </a:ext>
               <a:ext uri="{C183D7F6-B498-43B3-948B-1728B52AA6E4}">
                 <adec:decorative xmlns:adec="http://schemas.microsoft.com/office/drawing/2017/decorative" val="1"/>
               </a:ext>
             </a:extLst>
           </p:cNvPr>
-          <p:cNvSpPr>
-            <a:spLocks noGrp="1" noRot="1" noChangeAspect="1" noMove="1" noResize="1" noEditPoints="1" noAdjustHandles="1" noChangeArrowheads="1" noChangeShapeType="1" noTextEdit="1"/>
-          </p:cNvSpPr>
+          <p:cNvPicPr>
+            <a:picLocks noGrp="1" noRot="1" noChangeAspect="1" noMove="1" noResize="1" noEditPoints="1" noAdjustHandles="1" noChangeArrowheads="1" noChangeShapeType="1" noCrop="1"/>
+          </p:cNvPicPr>
           <p:nvPr>
             <p:extLst>
               <p:ext uri="{386F3935-93C4-4BCD-93E2-E3B085C9AB24}">
@@ -10038,17 +9917,184 @@
               </p:ext>
             </p:extLst>
           </p:nvPr>
-        </p:nvSpPr>
-        <p:spPr>
-          <a:xfrm>
-            <a:off x="9122301" y="4557357"/>
-            <a:ext cx="3077109" cy="1660332"/>
+        </p:nvPicPr>
+        <p:blipFill>
+          <a:blip r:embed="rId4">
+            <a:extLst>
+              <a:ext uri="{28A0092B-C50C-407E-A947-70E740481C1C}">
+                <a14:useLocalDpi xmlns:a14="http://schemas.microsoft.com/office/drawing/2010/main" val="0"/>
+              </a:ext>
+            </a:extLst>
+          </a:blip>
+          <a:stretch>
+            <a:fillRect/>
+          </a:stretch>
+        </p:blipFill>
+        <p:spPr>
+          <a:xfrm>
+            <a:off x="2" y="1970241"/>
+            <a:ext cx="4956048" cy="199787"/>
+          </a:xfrm>
+          <a:prstGeom prst="rect">
+            <a:avLst/>
+          </a:prstGeom>
+        </p:spPr>
+      </p:pic>
+      <p:sp>
+        <p:nvSpPr>
+          <p:cNvPr id="3" name="Content Placeholder 2">
+            <a:extLst>
+              <a:ext uri="{FF2B5EF4-FFF2-40B4-BE49-F238E27FC236}">
+                <a16:creationId xmlns:a16="http://schemas.microsoft.com/office/drawing/2014/main" id="{3C46A7FD-7EEB-497A-9986-F101129DA1A7}"/>
+              </a:ext>
+            </a:extLst>
+          </p:cNvPr>
+          <p:cNvSpPr>
+            <a:spLocks noGrp="1"/>
+          </p:cNvSpPr>
+          <p:nvPr>
+            <p:ph idx="1"/>
+          </p:nvPr>
+        </p:nvSpPr>
+        <p:spPr>
+          <a:xfrm>
+            <a:off x="172720" y="2336873"/>
+            <a:ext cx="1989455" cy="3599316"/>
+          </a:xfrm>
+        </p:spPr>
+        <p:txBody>
+          <a:bodyPr vert="horz" lIns="91440" tIns="45720" rIns="91440" bIns="45720" rtlCol="0">
+            <a:normAutofit/>
+          </a:bodyPr>
+          <a:lstStyle/>
+          <a:p>
+            <a:pPr marL="0" indent="0" algn="r">
+              <a:buNone/>
+            </a:pPr>
+            <a:r>
+              <a:rPr lang="en-US" sz="2000" dirty="0"/>
+              <a:t>Overall releases increase over course of the year.</a:t>
+            </a:r>
+          </a:p>
+        </p:txBody>
+      </p:sp>
+      <p:sp>
+        <p:nvSpPr>
+          <p:cNvPr id="4" name="AutoShape 2">
+            <a:extLst>
+              <a:ext uri="{FF2B5EF4-FFF2-40B4-BE49-F238E27FC236}">
+                <a16:creationId xmlns:a16="http://schemas.microsoft.com/office/drawing/2014/main" id="{915CD11D-EE41-4844-B735-E6BDF2CFF963}"/>
+              </a:ext>
+            </a:extLst>
+          </p:cNvPr>
+          <p:cNvSpPr>
+            <a:spLocks noChangeAspect="1" noChangeArrowheads="1"/>
+          </p:cNvSpPr>
+          <p:nvPr/>
+        </p:nvSpPr>
+        <p:spPr bwMode="auto">
+          <a:xfrm>
+            <a:off x="5943600" y="3276600"/>
+            <a:ext cx="304800" cy="304800"/>
+          </a:xfrm>
+          <a:prstGeom prst="rect">
+            <a:avLst/>
+          </a:prstGeom>
+          <a:noFill/>
+          <a:extLst>
+            <a:ext uri="{909E8E84-426E-40DD-AFC4-6F175D3DCCD1}">
+              <a14:hiddenFill xmlns:a14="http://schemas.microsoft.com/office/drawing/2010/main">
+                <a:solidFill>
+                  <a:srgbClr val="FFFFFF"/>
+                </a:solidFill>
+              </a14:hiddenFill>
+            </a:ext>
+          </a:extLst>
+        </p:spPr>
+        <p:txBody>
+          <a:bodyPr vert="horz" wrap="square" lIns="91440" tIns="45720" rIns="91440" bIns="45720" numCol="1" anchor="t" anchorCtr="0" compatLnSpc="1">
+            <a:prstTxWarp prst="textNoShape">
+              <a:avLst/>
+            </a:prstTxWarp>
+          </a:bodyPr>
+          <a:lstStyle/>
+          <a:p>
+            <a:endParaRPr lang="en-US"/>
+          </a:p>
+        </p:txBody>
+      </p:sp>
+      <p:pic>
+        <p:nvPicPr>
+          <p:cNvPr id="29" name="Picture 2">
+            <a:extLst>
+              <a:ext uri="{FF2B5EF4-FFF2-40B4-BE49-F238E27FC236}">
+                <a16:creationId xmlns:a16="http://schemas.microsoft.com/office/drawing/2014/main" id="{E1BC71E5-69CB-4C16-B5EF-4F2E3B91FE1A}"/>
+              </a:ext>
+            </a:extLst>
+          </p:cNvPr>
+          <p:cNvPicPr>
+            <a:picLocks noChangeAspect="1" noChangeArrowheads="1"/>
+          </p:cNvPicPr>
+          <p:nvPr/>
+        </p:nvPicPr>
+        <p:blipFill>
+          <a:blip r:embed="rId5">
+            <a:extLst>
+              <a:ext uri="{28A0092B-C50C-407E-A947-70E740481C1C}">
+                <a14:useLocalDpi xmlns:a14="http://schemas.microsoft.com/office/drawing/2010/main" val="0"/>
+              </a:ext>
+            </a:extLst>
+          </a:blip>
+          <a:srcRect/>
+          <a:stretch>
+            <a:fillRect/>
+          </a:stretch>
+        </p:blipFill>
+        <p:spPr bwMode="auto">
+          <a:xfrm>
+            <a:off x="-19011" y="5247641"/>
+            <a:ext cx="1610360" cy="1610360"/>
+          </a:xfrm>
+          <a:prstGeom prst="rect">
+            <a:avLst/>
+          </a:prstGeom>
+          <a:noFill/>
+          <a:extLst>
+            <a:ext uri="{909E8E84-426E-40DD-AFC4-6F175D3DCCD1}">
+              <a14:hiddenFill xmlns:a14="http://schemas.microsoft.com/office/drawing/2010/main">
+                <a:solidFill>
+                  <a:srgbClr val="FFFFFF"/>
+                </a:solidFill>
+              </a14:hiddenFill>
+            </a:ext>
+          </a:extLst>
+        </p:spPr>
+      </p:pic>
+      <p:sp>
+        <p:nvSpPr>
+          <p:cNvPr id="5" name="Rectangle 4">
+            <a:extLst>
+              <a:ext uri="{FF2B5EF4-FFF2-40B4-BE49-F238E27FC236}">
+                <a16:creationId xmlns:a16="http://schemas.microsoft.com/office/drawing/2014/main" id="{7D999403-447F-4912-9921-7852963BAF65}"/>
+              </a:ext>
+            </a:extLst>
+          </p:cNvPr>
+          <p:cNvSpPr/>
+          <p:nvPr/>
+        </p:nvSpPr>
+        <p:spPr>
+          <a:xfrm>
+            <a:off x="1960880" y="609600"/>
+            <a:ext cx="640080" cy="1360640"/>
           </a:xfrm>
           <a:prstGeom prst="rect">
             <a:avLst/>
           </a:prstGeom>
           <a:solidFill>
-            <a:schemeClr val="accent1"/>
+            <a:schemeClr val="bg1">
+              <a:lumMod val="85000"/>
+              <a:lumOff val="15000"/>
+            </a:schemeClr>
           </a:solidFill>
           <a:ln>
             <a:noFill/>
@@ -10070,44 +10116,119 @@
             <a:schemeClr val="lt1"/>
           </a:fontRef>
         </p:style>
-      </p:sp>
-      <p:sp>
-        <p:nvSpPr>
-          <p:cNvPr id="98" name="Rectangle 97">
+        <p:txBody>
+          <a:bodyPr rtlCol="0" anchor="ctr"/>
+          <a:lstStyle/>
+          <a:p>
+            <a:pPr algn="ctr"/>
+            <a:endParaRPr lang="en-US"/>
+          </a:p>
+        </p:txBody>
+      </p:sp>
+      <p:pic>
+        <p:nvPicPr>
+          <p:cNvPr id="14" name="Picture 13" descr="Chart, bar chart&#10;&#10;Description automatically generated">
             <a:extLst>
               <a:ext uri="{FF2B5EF4-FFF2-40B4-BE49-F238E27FC236}">
-                <a16:creationId xmlns:a16="http://schemas.microsoft.com/office/drawing/2014/main" id="{B474C815-630A-48EC-AEF2-64E56D96F4BA}"/>
-              </a:ext>
-              <a:ext uri="{C183D7F6-B498-43B3-948B-1728B52AA6E4}">
-                <adec:decorative xmlns:adec="http://schemas.microsoft.com/office/drawing/2017/decorative" val="1"/>
+                <a16:creationId xmlns:a16="http://schemas.microsoft.com/office/drawing/2014/main" id="{3D8B78C6-F421-4F58-BFB2-444148BECE54}"/>
               </a:ext>
             </a:extLst>
           </p:cNvPr>
-          <p:cNvSpPr>
-            <a:spLocks noGrp="1" noRot="1" noChangeAspect="1" noMove="1" noResize="1" noEditPoints="1" noAdjustHandles="1" noChangeArrowheads="1" noChangeShapeType="1" noTextEdit="1"/>
-          </p:cNvSpPr>
-          <p:nvPr>
-            <p:extLst>
-              <p:ext uri="{386F3935-93C4-4BCD-93E2-E3B085C9AB24}">
-                <p16:designElem xmlns:p16="http://schemas.microsoft.com/office/powerpoint/2015/main" val="1"/>
-              </p:ext>
-            </p:extLst>
-          </p:nvPr>
-        </p:nvSpPr>
-        <p:spPr>
-          <a:xfrm>
-            <a:off x="10586" y="6210130"/>
-            <a:ext cx="8968085" cy="275942"/>
+          <p:cNvPicPr>
+            <a:picLocks noChangeAspect="1"/>
+          </p:cNvPicPr>
+          <p:nvPr/>
+        </p:nvPicPr>
+        <p:blipFill>
+          <a:blip r:embed="rId6">
+            <a:extLst>
+              <a:ext uri="{28A0092B-C50C-407E-A947-70E740481C1C}">
+                <a14:useLocalDpi xmlns:a14="http://schemas.microsoft.com/office/drawing/2010/main" val="0"/>
+              </a:ext>
+            </a:extLst>
+          </a:blip>
+          <a:stretch>
+            <a:fillRect/>
+          </a:stretch>
+        </p:blipFill>
+        <p:spPr>
+          <a:xfrm>
+            <a:off x="2768891" y="676494"/>
+            <a:ext cx="9435768" cy="5614281"/>
           </a:xfrm>
           <a:prstGeom prst="rect">
             <a:avLst/>
           </a:prstGeom>
-          <a:blipFill>
-            <a:blip r:embed="rId6"/>
-            <a:stretch>
-              <a:fillRect/>
-            </a:stretch>
-          </a:blipFill>
+          <a:ln>
+            <a:noFill/>
+          </a:ln>
+          <a:effectLst>
+            <a:outerShdw blurRad="76200" dist="63500" dir="5040000" algn="tl" rotWithShape="0">
+              <a:srgbClr val="000000">
+                <a:alpha val="41000"/>
+              </a:srgbClr>
+            </a:outerShdw>
+          </a:effectLst>
+        </p:spPr>
+      </p:pic>
+      <p:sp>
+        <p:nvSpPr>
+          <p:cNvPr id="2" name="Title 1">
+            <a:extLst>
+              <a:ext uri="{FF2B5EF4-FFF2-40B4-BE49-F238E27FC236}">
+                <a16:creationId xmlns:a16="http://schemas.microsoft.com/office/drawing/2014/main" id="{155FB509-870E-4172-B005-4C97A76D0D85}"/>
+              </a:ext>
+            </a:extLst>
+          </p:cNvPr>
+          <p:cNvSpPr>
+            <a:spLocks noGrp="1"/>
+          </p:cNvSpPr>
+          <p:nvPr>
+            <p:ph type="title"/>
+          </p:nvPr>
+        </p:nvSpPr>
+        <p:spPr>
+          <a:xfrm>
+            <a:off x="680321" y="753228"/>
+            <a:ext cx="4136123" cy="1080938"/>
+          </a:xfrm>
+        </p:spPr>
+        <p:txBody>
+          <a:bodyPr vert="horz" lIns="91440" tIns="45720" rIns="91440" bIns="45720" rtlCol="0">
+            <a:normAutofit/>
+          </a:bodyPr>
+          <a:lstStyle/>
+          <a:p>
+            <a:r>
+              <a:rPr lang="en-US" sz="3200" dirty="0"/>
+              <a:t>Results</a:t>
+            </a:r>
+          </a:p>
+        </p:txBody>
+      </p:sp>
+      <p:sp>
+        <p:nvSpPr>
+          <p:cNvPr id="7" name="Rectangle 6">
+            <a:extLst>
+              <a:ext uri="{FF2B5EF4-FFF2-40B4-BE49-F238E27FC236}">
+                <a16:creationId xmlns:a16="http://schemas.microsoft.com/office/drawing/2014/main" id="{649024A9-1CB7-4661-8683-0544237CCD6E}"/>
+              </a:ext>
+            </a:extLst>
+          </p:cNvPr>
+          <p:cNvSpPr/>
+          <p:nvPr/>
+        </p:nvSpPr>
+        <p:spPr>
+          <a:xfrm>
+            <a:off x="2768260" y="-2"/>
+            <a:ext cx="9440442" cy="753230"/>
+          </a:xfrm>
+          <a:prstGeom prst="rect">
+            <a:avLst/>
+          </a:prstGeom>
+          <a:solidFill>
+            <a:schemeClr val="tx1"/>
+          </a:solidFill>
           <a:ln>
             <a:noFill/>
           </a:ln>
@@ -10139,41 +10260,27 @@
       </p:sp>
       <p:sp>
         <p:nvSpPr>
-          <p:cNvPr id="100" name="Rectangle 99">
+          <p:cNvPr id="16" name="Rectangle 15">
             <a:extLst>
               <a:ext uri="{FF2B5EF4-FFF2-40B4-BE49-F238E27FC236}">
-                <a16:creationId xmlns:a16="http://schemas.microsoft.com/office/drawing/2014/main" id="{812CA8B2-30BF-4774-9C0D-611F4F8D6E66}"/>
-              </a:ext>
-              <a:ext uri="{C183D7F6-B498-43B3-948B-1728B52AA6E4}">
-                <adec:decorative xmlns:adec="http://schemas.microsoft.com/office/drawing/2017/decorative" val="1"/>
+                <a16:creationId xmlns:a16="http://schemas.microsoft.com/office/drawing/2014/main" id="{7663D789-2F29-4704-BF20-60C8F0AE2CED}"/>
               </a:ext>
             </a:extLst>
           </p:cNvPr>
-          <p:cNvSpPr>
-            <a:spLocks noGrp="1" noRot="1" noChangeAspect="1" noMove="1" noResize="1" noEditPoints="1" noAdjustHandles="1" noChangeArrowheads="1" noChangeShapeType="1" noTextEdit="1"/>
-          </p:cNvSpPr>
-          <p:nvPr>
-            <p:extLst>
-              <p:ext uri="{386F3935-93C4-4BCD-93E2-E3B085C9AB24}">
-                <p16:designElem xmlns:p16="http://schemas.microsoft.com/office/powerpoint/2015/main" val="1"/>
-              </p:ext>
-            </p:extLst>
-          </p:nvPr>
-        </p:nvSpPr>
-        <p:spPr>
-          <a:xfrm>
-            <a:off x="9122301" y="6210130"/>
-            <a:ext cx="3080285" cy="275942"/>
+          <p:cNvSpPr/>
+          <p:nvPr/>
+        </p:nvSpPr>
+        <p:spPr>
+          <a:xfrm>
+            <a:off x="2773730" y="6248398"/>
+            <a:ext cx="9440442" cy="753230"/>
           </a:xfrm>
           <a:prstGeom prst="rect">
             <a:avLst/>
           </a:prstGeom>
-          <a:blipFill>
-            <a:blip r:embed="rId7"/>
-            <a:stretch>
-              <a:fillRect/>
-            </a:stretch>
-          </a:blipFill>
+          <a:solidFill>
+            <a:schemeClr val="tx1"/>
+          </a:solidFill>
           <a:ln>
             <a:noFill/>
           </a:ln>
@@ -10203,52 +10310,12 @@
           </a:p>
         </p:txBody>
       </p:sp>
-      <p:pic>
-        <p:nvPicPr>
-          <p:cNvPr id="23" name="Picture 22" descr="Chart, line chart&#10;&#10;Description automatically generated">
+      <p:sp>
+        <p:nvSpPr>
+          <p:cNvPr id="18" name="Rectangle 17">
             <a:extLst>
               <a:ext uri="{FF2B5EF4-FFF2-40B4-BE49-F238E27FC236}">
-                <a16:creationId xmlns:a16="http://schemas.microsoft.com/office/drawing/2014/main" id="{14189245-F871-431F-9603-029DD2A2AA16}"/>
-              </a:ext>
-            </a:extLst>
-          </p:cNvPr>
-          <p:cNvPicPr>
-            <a:picLocks noChangeAspect="1"/>
-          </p:cNvPicPr>
-          <p:nvPr/>
-        </p:nvPicPr>
-        <p:blipFill>
-          <a:blip r:embed="rId8">
-            <a:extLst>
-              <a:ext uri="{28A0092B-C50C-407E-A947-70E740481C1C}">
-                <a14:useLocalDpi xmlns:a14="http://schemas.microsoft.com/office/drawing/2010/main" val="0"/>
-              </a:ext>
-            </a:extLst>
-          </a:blip>
-          <a:stretch>
-            <a:fillRect/>
-          </a:stretch>
-        </p:blipFill>
-        <p:spPr>
-          <a:xfrm>
-            <a:off x="1801974" y="0"/>
-            <a:ext cx="8581699" cy="4913021"/>
-          </a:xfrm>
-          <a:prstGeom prst="rect">
-            <a:avLst/>
-          </a:prstGeom>
-          <a:ln>
-            <a:noFill/>
-          </a:ln>
-          <a:effectLst/>
-        </p:spPr>
-      </p:pic>
-      <p:sp>
-        <p:nvSpPr>
-          <p:cNvPr id="4" name="Rectangle 3">
-            <a:extLst>
-              <a:ext uri="{FF2B5EF4-FFF2-40B4-BE49-F238E27FC236}">
-                <a16:creationId xmlns:a16="http://schemas.microsoft.com/office/drawing/2014/main" id="{30E08104-C681-4B57-8139-A11A59F6B5C2}"/>
+                <a16:creationId xmlns:a16="http://schemas.microsoft.com/office/drawing/2014/main" id="{080289ED-9FA0-4D0C-8041-B4B738E7F74F}"/>
               </a:ext>
             </a:extLst>
           </p:cNvPr>
@@ -10257,14 +10324,17 @@
         </p:nvSpPr>
         <p:spPr>
           <a:xfrm>
-            <a:off x="10292080" y="0"/>
-            <a:ext cx="2040374" cy="4913021"/>
+            <a:off x="2510840" y="612915"/>
+            <a:ext cx="640080" cy="1360640"/>
           </a:xfrm>
           <a:prstGeom prst="rect">
             <a:avLst/>
           </a:prstGeom>
           <a:solidFill>
-            <a:schemeClr val="tx1"/>
+            <a:schemeClr val="bg1">
+              <a:lumMod val="85000"/>
+              <a:lumOff val="15000"/>
+            </a:schemeClr>
           </a:solidFill>
           <a:ln>
             <a:noFill/>
@@ -10295,12 +10365,51 @@
           </a:p>
         </p:txBody>
       </p:sp>
-      <p:sp>
-        <p:nvSpPr>
-          <p:cNvPr id="25" name="Rectangle 24">
+      <p:pic>
+        <p:nvPicPr>
+          <p:cNvPr id="20" name="Picture 19">
             <a:extLst>
               <a:ext uri="{FF2B5EF4-FFF2-40B4-BE49-F238E27FC236}">
-                <a16:creationId xmlns:a16="http://schemas.microsoft.com/office/drawing/2014/main" id="{8F27520F-A9AA-4F3F-B60C-3A27C8CD51BA}"/>
+                <a16:creationId xmlns:a16="http://schemas.microsoft.com/office/drawing/2014/main" id="{5708D27C-68F0-459D-8A2A-679D8E0B73B2}"/>
+              </a:ext>
+            </a:extLst>
+          </p:cNvPr>
+          <p:cNvPicPr>
+            <a:picLocks noChangeAspect="1"/>
+          </p:cNvPicPr>
+          <p:nvPr/>
+        </p:nvPicPr>
+        <p:blipFill>
+          <a:blip r:embed="rId7">
+            <a:extLst>
+              <a:ext uri="{28A0092B-C50C-407E-A947-70E740481C1C}">
+                <a14:useLocalDpi xmlns:a14="http://schemas.microsoft.com/office/drawing/2010/main" val="0"/>
+              </a:ext>
+            </a:extLst>
+          </a:blip>
+          <a:srcRect/>
+          <a:stretch/>
+        </p:blipFill>
+        <p:spPr>
+          <a:xfrm>
+            <a:off x="2447407" y="5342"/>
+            <a:ext cx="9885047" cy="6848854"/>
+          </a:xfrm>
+          <a:prstGeom prst="rect">
+            <a:avLst/>
+          </a:prstGeom>
+          <a:ln>
+            <a:noFill/>
+          </a:ln>
+          <a:effectLst/>
+        </p:spPr>
+      </p:pic>
+      <p:sp>
+        <p:nvSpPr>
+          <p:cNvPr id="21" name="Rectangle 20">
+            <a:extLst>
+              <a:ext uri="{FF2B5EF4-FFF2-40B4-BE49-F238E27FC236}">
+                <a16:creationId xmlns:a16="http://schemas.microsoft.com/office/drawing/2014/main" id="{617115CD-BFB1-4723-9ACB-B5B3B148C6B5}"/>
               </a:ext>
             </a:extLst>
           </p:cNvPr>
@@ -10309,14 +10418,17 @@
         </p:nvSpPr>
         <p:spPr>
           <a:xfrm>
-            <a:off x="-7410" y="-1"/>
-            <a:ext cx="2040374" cy="4913021"/>
+            <a:off x="2428342" y="612146"/>
+            <a:ext cx="640080" cy="1360640"/>
           </a:xfrm>
           <a:prstGeom prst="rect">
             <a:avLst/>
           </a:prstGeom>
           <a:solidFill>
-            <a:schemeClr val="tx1"/>
+            <a:schemeClr val="bg1">
+              <a:lumMod val="85000"/>
+              <a:lumOff val="15000"/>
+            </a:schemeClr>
           </a:solidFill>
           <a:ln>
             <a:noFill/>
@@ -10350,111 +10462,54 @@
     </p:spTree>
     <p:extLst>
       <p:ext uri="{BB962C8B-B14F-4D97-AF65-F5344CB8AC3E}">
-        <p14:creationId xmlns:p14="http://schemas.microsoft.com/office/powerpoint/2010/main" val="1943584415"/>
+        <p14:creationId xmlns:p14="http://schemas.microsoft.com/office/powerpoint/2010/main" val="1981910401"/>
       </p:ext>
     </p:extLst>
   </p:cSld>
   <p:clrMapOvr>
     <a:masterClrMapping/>
   </p:clrMapOvr>
-  <p:timing>
-    <p:tnLst>
-      <p:par>
-        <p:cTn id="1" dur="indefinite" restart="never" nodeType="tmRoot">
-          <p:childTnLst>
-            <p:seq concurrent="1" nextAc="seek">
-              <p:cTn id="2" dur="indefinite" nodeType="mainSeq">
-                <p:childTnLst>
-                  <p:par>
-                    <p:cTn id="3" fill="hold">
-                      <p:stCondLst>
-                        <p:cond delay="indefinite"/>
-                        <p:cond evt="onBegin" delay="0">
-                          <p:tn val="2"/>
-                        </p:cond>
-                      </p:stCondLst>
-                      <p:childTnLst>
-                        <p:par>
-                          <p:cTn id="4" fill="hold">
-                            <p:stCondLst>
-                              <p:cond delay="0"/>
-                            </p:stCondLst>
-                            <p:childTnLst>
-                              <p:par>
-                                <p:cTn id="5" presetID="10" presetClass="entr" presetSubtype="0" fill="hold" grpId="0" nodeType="withEffect">
-                                  <p:stCondLst>
-                                    <p:cond delay="1000"/>
-                                  </p:stCondLst>
-                                  <p:iterate>
-                                    <p:tmPct val="10000"/>
-                                  </p:iterate>
-                                  <p:childTnLst>
-                                    <p:set>
-                                      <p:cBhvr>
-                                        <p:cTn id="6" dur="1" fill="hold">
-                                          <p:stCondLst>
-                                            <p:cond delay="0"/>
-                                          </p:stCondLst>
-                                        </p:cTn>
-                                        <p:tgtEl>
-                                          <p:spTgt spid="2"/>
-                                        </p:tgtEl>
-                                        <p:attrNameLst>
-                                          <p:attrName>style.visibility</p:attrName>
-                                        </p:attrNameLst>
-                                      </p:cBhvr>
-                                      <p:to>
-                                        <p:strVal val="visible"/>
-                                      </p:to>
-                                    </p:set>
-                                    <p:animEffect transition="in" filter="fade">
-                                      <p:cBhvr>
-                                        <p:cTn id="7" dur="700"/>
-                                        <p:tgtEl>
-                                          <p:spTgt spid="2"/>
-                                        </p:tgtEl>
-                                      </p:cBhvr>
-                                    </p:animEffect>
-                                  </p:childTnLst>
-                                </p:cTn>
-                              </p:par>
-                            </p:childTnLst>
-                          </p:cTn>
-                        </p:par>
-                      </p:childTnLst>
-                    </p:cTn>
-                  </p:par>
-                </p:childTnLst>
-              </p:cTn>
-              <p:prevCondLst>
-                <p:cond evt="onPrev" delay="0">
-                  <p:tgtEl>
-                    <p:sldTgt/>
-                  </p:tgtEl>
-                </p:cond>
-              </p:prevCondLst>
-              <p:nextCondLst>
-                <p:cond evt="onNext" delay="0">
-                  <p:tgtEl>
-                    <p:sldTgt/>
-                  </p:tgtEl>
-                </p:cond>
-              </p:nextCondLst>
-            </p:seq>
-          </p:childTnLst>
-        </p:cTn>
-      </p:par>
-    </p:tnLst>
-    <p:bldLst>
-      <p:bldP spid="2" grpId="0"/>
-    </p:bldLst>
-  </p:timing>
 </p:sld>
 </file>
 
 <file path=ppt/slides/slide11.xml><?xml version="1.0" encoding="utf-8"?>
 <p:sld xmlns:a="http://schemas.openxmlformats.org/drawingml/2006/main" xmlns:r="http://schemas.openxmlformats.org/officeDocument/2006/relationships" xmlns:p="http://schemas.openxmlformats.org/presentationml/2006/main">
   <p:cSld>
+    <p:bg>
+      <p:bgPr>
+        <a:gradFill rotWithShape="1">
+          <a:gsLst>
+            <a:gs pos="0">
+              <a:schemeClr val="bg2">
+                <a:tint val="96000"/>
+                <a:shade val="100000"/>
+                <a:hueMod val="92000"/>
+                <a:satMod val="200000"/>
+                <a:lumMod val="128000"/>
+              </a:schemeClr>
+            </a:gs>
+            <a:gs pos="50000">
+              <a:schemeClr val="bg2">
+                <a:shade val="100000"/>
+                <a:hueMod val="100000"/>
+                <a:satMod val="110000"/>
+                <a:lumMod val="130000"/>
+              </a:schemeClr>
+            </a:gs>
+            <a:gs pos="100000">
+              <a:schemeClr val="bg2">
+                <a:shade val="78000"/>
+                <a:hueMod val="118000"/>
+                <a:satMod val="120000"/>
+                <a:lumMod val="69000"/>
+              </a:schemeClr>
+            </a:gs>
+          </a:gsLst>
+          <a:lin ang="2520000" scaled="0"/>
+        </a:gradFill>
+        <a:effectLst/>
+      </p:bgPr>
+    </p:bg>
     <p:spTree>
       <p:nvGrpSpPr>
         <p:cNvPr id="1" name=""/>
@@ -10469,117 +10524,328 @@
           <a:chExt cx="0" cy="0"/>
         </a:xfrm>
       </p:grpSpPr>
-      <p:sp>
-        <p:nvSpPr>
-          <p:cNvPr id="2" name="Title 1">
+      <p:sp useBgFill="1">
+        <p:nvSpPr>
+          <p:cNvPr id="11" name="Rectangle 10">
             <a:extLst>
               <a:ext uri="{FF2B5EF4-FFF2-40B4-BE49-F238E27FC236}">
-                <a16:creationId xmlns:a16="http://schemas.microsoft.com/office/drawing/2014/main" id="{A32C2566-E304-4158-B0FF-3108A45C2C46}"/>
+                <a16:creationId xmlns:a16="http://schemas.microsoft.com/office/drawing/2014/main" id="{8DCA3673-CDE4-40C5-9FA8-F89874CFBA73}"/>
+              </a:ext>
+              <a:ext uri="{C183D7F6-B498-43B3-948B-1728B52AA6E4}">
+                <adec:decorative xmlns:adec="http://schemas.microsoft.com/office/drawing/2017/decorative" val="1"/>
               </a:ext>
             </a:extLst>
           </p:cNvPr>
           <p:cNvSpPr>
-            <a:spLocks noGrp="1"/>
-          </p:cNvSpPr>
-          <p:nvPr>
-            <p:ph type="title"/>
-          </p:nvPr>
-        </p:nvSpPr>
-        <p:spPr/>
-        <p:txBody>
-          <a:bodyPr/>
+            <a:spLocks noGrp="1" noRot="1" noChangeAspect="1" noMove="1" noResize="1" noEditPoints="1" noAdjustHandles="1" noChangeArrowheads="1" noChangeShapeType="1" noTextEdit="1"/>
+          </p:cNvSpPr>
+          <p:nvPr>
+            <p:extLst>
+              <p:ext uri="{386F3935-93C4-4BCD-93E2-E3B085C9AB24}">
+                <p16:designElem xmlns:p16="http://schemas.microsoft.com/office/powerpoint/2015/main" val="1"/>
+              </p:ext>
+            </p:extLst>
+          </p:nvPr>
+        </p:nvSpPr>
+        <p:spPr>
+          <a:xfrm>
+            <a:off x="0" y="-1"/>
+            <a:ext cx="12188824" cy="6858001"/>
+          </a:xfrm>
+          <a:prstGeom prst="rect">
+            <a:avLst/>
+          </a:prstGeom>
+        </p:spPr>
+        <p:style>
+          <a:lnRef idx="2">
+            <a:schemeClr val="accent1">
+              <a:shade val="50000"/>
+            </a:schemeClr>
+          </a:lnRef>
+          <a:fillRef idx="1">
+            <a:schemeClr val="accent1"/>
+          </a:fillRef>
+          <a:effectRef idx="0">
+            <a:schemeClr val="accent1"/>
+          </a:effectRef>
+          <a:fontRef idx="minor">
+            <a:schemeClr val="lt1"/>
+          </a:fontRef>
+        </p:style>
+        <p:txBody>
+          <a:bodyPr rtlCol="0" anchor="ctr"/>
           <a:lstStyle/>
           <a:p>
-            <a:r>
-              <a:rPr lang="en-US" dirty="0"/>
-              <a:t>Conclusions</a:t>
-            </a:r>
-          </a:p>
-        </p:txBody>
-      </p:sp>
-      <p:sp>
-        <p:nvSpPr>
-          <p:cNvPr id="3" name="Content Placeholder 2">
-            <a:extLst>
-              <a:ext uri="{FF2B5EF4-FFF2-40B4-BE49-F238E27FC236}">
-                <a16:creationId xmlns:a16="http://schemas.microsoft.com/office/drawing/2014/main" id="{9BCBE210-1392-4176-9960-1E409D18DFF9}"/>
-              </a:ext>
-            </a:extLst>
-          </p:cNvPr>
-          <p:cNvSpPr>
-            <a:spLocks noGrp="1"/>
-          </p:cNvSpPr>
-          <p:nvPr>
-            <p:ph idx="1"/>
-          </p:nvPr>
-        </p:nvSpPr>
-        <p:spPr/>
-        <p:txBody>
-          <a:bodyPr>
-            <a:normAutofit fontScale="92500"/>
-          </a:bodyPr>
-          <a:lstStyle/>
-          <a:p>
-            <a:r>
-              <a:rPr lang="en-US" dirty="0"/>
-              <a:t>As a new production company, Microsoft should focus on the best return for their investment. This will ensure revenue for future products.</a:t>
-            </a:r>
-          </a:p>
-          <a:p>
-            <a:endParaRPr lang="en-US" dirty="0"/>
-          </a:p>
-          <a:p>
-            <a:r>
-              <a:rPr lang="en-US" dirty="0"/>
-              <a:t>Direct competition with established studios should focus on the Thriller genre.</a:t>
-            </a:r>
-          </a:p>
-          <a:p>
-            <a:pPr lvl="1"/>
-            <a:endParaRPr lang="en-US" dirty="0"/>
-          </a:p>
-          <a:p>
-            <a:r>
-              <a:rPr lang="en-US" dirty="0"/>
-              <a:t>Release schedule should take advantage of end of year and late spring lulls in order to maximize visibility of product. Limited competition requires decreased marketing budget for these offerings. </a:t>
-            </a:r>
-          </a:p>
-          <a:p>
-            <a:endParaRPr lang="en-US" dirty="0"/>
+            <a:pPr algn="ctr"/>
+            <a:endParaRPr lang="en-US"/>
           </a:p>
         </p:txBody>
       </p:sp>
       <p:pic>
         <p:nvPicPr>
-          <p:cNvPr id="4" name="Picture 2">
+          <p:cNvPr id="13" name="Picture 12">
             <a:extLst>
               <a:ext uri="{FF2B5EF4-FFF2-40B4-BE49-F238E27FC236}">
-                <a16:creationId xmlns:a16="http://schemas.microsoft.com/office/drawing/2014/main" id="{DCD4BD71-CC9B-4FA1-ABEC-15E9B2FA3AA2}"/>
+                <a16:creationId xmlns:a16="http://schemas.microsoft.com/office/drawing/2014/main" id="{95756E8F-499C-4533-BBE8-309C3E8D985C}"/>
+              </a:ext>
+              <a:ext uri="{C183D7F6-B498-43B3-948B-1728B52AA6E4}">
+                <adec:decorative xmlns:adec="http://schemas.microsoft.com/office/drawing/2017/decorative" val="1"/>
               </a:ext>
             </a:extLst>
           </p:cNvPr>
           <p:cNvPicPr>
-            <a:picLocks noChangeAspect="1" noChangeArrowheads="1"/>
+            <a:picLocks noGrp="1" noRot="1" noChangeAspect="1" noMove="1" noResize="1" noEditPoints="1" noAdjustHandles="1" noChangeArrowheads="1" noChangeShapeType="1" noCrop="1"/>
           </p:cNvPicPr>
-          <p:nvPr/>
+          <p:nvPr>
+            <p:extLst>
+              <p:ext uri="{386F3935-93C4-4BCD-93E2-E3B085C9AB24}">
+                <p16:designElem xmlns:p16="http://schemas.microsoft.com/office/powerpoint/2015/main" val="1"/>
+              </p:ext>
+            </p:extLst>
+          </p:nvPr>
         </p:nvPicPr>
         <p:blipFill>
           <a:blip r:embed="rId3">
+            <a:alphaModFix amt="10000"/>
             <a:extLst>
               <a:ext uri="{28A0092B-C50C-407E-A947-70E740481C1C}">
                 <a14:useLocalDpi xmlns:a14="http://schemas.microsoft.com/office/drawing/2010/main" val="0"/>
               </a:ext>
             </a:extLst>
           </a:blip>
-          <a:srcRect/>
           <a:stretch>
             <a:fillRect/>
           </a:stretch>
         </p:blipFill>
+        <p:spPr>
+          <a:xfrm>
+            <a:off x="-3176" y="0"/>
+            <a:ext cx="12192000" cy="6858000"/>
+          </a:xfrm>
+          <a:prstGeom prst="rect">
+            <a:avLst/>
+          </a:prstGeom>
+        </p:spPr>
+      </p:pic>
+      <p:sp>
+        <p:nvSpPr>
+          <p:cNvPr id="15" name="Rectangle 14">
+            <a:extLst>
+              <a:ext uri="{FF2B5EF4-FFF2-40B4-BE49-F238E27FC236}">
+                <a16:creationId xmlns:a16="http://schemas.microsoft.com/office/drawing/2014/main" id="{0FFFD040-32A9-4D2B-86CA-599D030A4161}"/>
+              </a:ext>
+              <a:ext uri="{C183D7F6-B498-43B3-948B-1728B52AA6E4}">
+                <adec:decorative xmlns:adec="http://schemas.microsoft.com/office/drawing/2017/decorative" val="1"/>
+              </a:ext>
+            </a:extLst>
+          </p:cNvPr>
+          <p:cNvSpPr>
+            <a:spLocks noGrp="1" noRot="1" noChangeAspect="1" noMove="1" noResize="1" noEditPoints="1" noAdjustHandles="1" noChangeArrowheads="1" noChangeShapeType="1" noTextEdit="1"/>
+          </p:cNvSpPr>
+          <p:nvPr>
+            <p:extLst>
+              <p:ext uri="{386F3935-93C4-4BCD-93E2-E3B085C9AB24}">
+                <p16:designElem xmlns:p16="http://schemas.microsoft.com/office/powerpoint/2015/main" val="1"/>
+              </p:ext>
+            </p:extLst>
+          </p:nvPr>
+        </p:nvSpPr>
+        <p:spPr>
+          <a:xfrm>
+            <a:off x="4639056" y="0"/>
+            <a:ext cx="7552944" cy="6858001"/>
+          </a:xfrm>
+          <a:prstGeom prst="rect">
+            <a:avLst/>
+          </a:prstGeom>
+          <a:ln>
+            <a:noFill/>
+          </a:ln>
+        </p:spPr>
+        <p:style>
+          <a:lnRef idx="2">
+            <a:schemeClr val="accent1">
+              <a:shade val="50000"/>
+            </a:schemeClr>
+          </a:lnRef>
+          <a:fillRef idx="1">
+            <a:schemeClr val="accent1"/>
+          </a:fillRef>
+          <a:effectRef idx="0">
+            <a:schemeClr val="accent1"/>
+          </a:effectRef>
+          <a:fontRef idx="minor">
+            <a:schemeClr val="lt1"/>
+          </a:fontRef>
+        </p:style>
+        <p:txBody>
+          <a:bodyPr rtlCol="0" anchor="ctr"/>
+          <a:lstStyle/>
+          <a:p>
+            <a:pPr algn="ctr"/>
+            <a:endParaRPr lang="en-US"/>
+          </a:p>
+        </p:txBody>
+      </p:sp>
+      <p:sp>
+        <p:nvSpPr>
+          <p:cNvPr id="17" name="Rectangle 16">
+            <a:extLst>
+              <a:ext uri="{FF2B5EF4-FFF2-40B4-BE49-F238E27FC236}">
+                <a16:creationId xmlns:a16="http://schemas.microsoft.com/office/drawing/2014/main" id="{863205CA-B7FF-4C25-A4C8-3BBBCE19D950}"/>
+              </a:ext>
+              <a:ext uri="{C183D7F6-B498-43B3-948B-1728B52AA6E4}">
+                <adec:decorative xmlns:adec="http://schemas.microsoft.com/office/drawing/2017/decorative" val="1"/>
+              </a:ext>
+            </a:extLst>
+          </p:cNvPr>
+          <p:cNvSpPr>
+            <a:spLocks noGrp="1" noRot="1" noChangeAspect="1" noMove="1" noResize="1" noEditPoints="1" noAdjustHandles="1" noChangeArrowheads="1" noChangeShapeType="1" noTextEdit="1"/>
+          </p:cNvSpPr>
+          <p:nvPr>
+            <p:extLst>
+              <p:ext uri="{386F3935-93C4-4BCD-93E2-E3B085C9AB24}">
+                <p16:designElem xmlns:p16="http://schemas.microsoft.com/office/powerpoint/2015/main" val="1"/>
+              </p:ext>
+            </p:extLst>
+          </p:nvPr>
+        </p:nvSpPr>
+        <p:spPr bwMode="grayWhite">
+          <a:xfrm>
+            <a:off x="2" y="609600"/>
+            <a:ext cx="4959094" cy="1368198"/>
+          </a:xfrm>
+          <a:prstGeom prst="rect">
+            <a:avLst/>
+          </a:prstGeom>
+          <a:solidFill>
+            <a:schemeClr val="bg1">
+              <a:lumMod val="85000"/>
+              <a:lumOff val="15000"/>
+            </a:schemeClr>
+          </a:solidFill>
+          <a:ln>
+            <a:noFill/>
+          </a:ln>
+        </p:spPr>
+        <p:style>
+          <a:lnRef idx="2">
+            <a:schemeClr val="accent1">
+              <a:shade val="50000"/>
+            </a:schemeClr>
+          </a:lnRef>
+          <a:fillRef idx="1">
+            <a:schemeClr val="accent1"/>
+          </a:fillRef>
+          <a:effectRef idx="0">
+            <a:schemeClr val="accent1"/>
+          </a:effectRef>
+          <a:fontRef idx="minor">
+            <a:schemeClr val="lt1"/>
+          </a:fontRef>
+        </p:style>
+      </p:sp>
+      <p:pic>
+        <p:nvPicPr>
+          <p:cNvPr id="19" name="Picture 18">
+            <a:extLst>
+              <a:ext uri="{FF2B5EF4-FFF2-40B4-BE49-F238E27FC236}">
+                <a16:creationId xmlns:a16="http://schemas.microsoft.com/office/drawing/2014/main" id="{306E3F32-3C1A-4B6E-AF26-8A15A788560F}"/>
+              </a:ext>
+              <a:ext uri="{C183D7F6-B498-43B3-948B-1728B52AA6E4}">
+                <adec:decorative xmlns:adec="http://schemas.microsoft.com/office/drawing/2017/decorative" val="1"/>
+              </a:ext>
+            </a:extLst>
+          </p:cNvPr>
+          <p:cNvPicPr>
+            <a:picLocks noGrp="1" noRot="1" noChangeAspect="1" noMove="1" noResize="1" noEditPoints="1" noAdjustHandles="1" noChangeArrowheads="1" noChangeShapeType="1" noCrop="1"/>
+          </p:cNvPicPr>
+          <p:nvPr>
+            <p:extLst>
+              <p:ext uri="{386F3935-93C4-4BCD-93E2-E3B085C9AB24}">
+                <p16:designElem xmlns:p16="http://schemas.microsoft.com/office/powerpoint/2015/main" val="1"/>
+              </p:ext>
+            </p:extLst>
+          </p:nvPr>
+        </p:nvPicPr>
+        <p:blipFill>
+          <a:blip r:embed="rId4">
+            <a:extLst>
+              <a:ext uri="{28A0092B-C50C-407E-A947-70E740481C1C}">
+                <a14:useLocalDpi xmlns:a14="http://schemas.microsoft.com/office/drawing/2010/main" val="0"/>
+              </a:ext>
+            </a:extLst>
+          </a:blip>
+          <a:stretch>
+            <a:fillRect/>
+          </a:stretch>
+        </p:blipFill>
+        <p:spPr>
+          <a:xfrm>
+            <a:off x="2" y="1970241"/>
+            <a:ext cx="4956048" cy="199787"/>
+          </a:xfrm>
+          <a:prstGeom prst="rect">
+            <a:avLst/>
+          </a:prstGeom>
+        </p:spPr>
+      </p:pic>
+      <p:sp>
+        <p:nvSpPr>
+          <p:cNvPr id="3" name="Content Placeholder 2">
+            <a:extLst>
+              <a:ext uri="{FF2B5EF4-FFF2-40B4-BE49-F238E27FC236}">
+                <a16:creationId xmlns:a16="http://schemas.microsoft.com/office/drawing/2014/main" id="{3C46A7FD-7EEB-497A-9986-F101129DA1A7}"/>
+              </a:ext>
+            </a:extLst>
+          </p:cNvPr>
+          <p:cNvSpPr>
+            <a:spLocks noGrp="1"/>
+          </p:cNvSpPr>
+          <p:nvPr>
+            <p:ph idx="1"/>
+          </p:nvPr>
+        </p:nvSpPr>
+        <p:spPr>
+          <a:xfrm>
+            <a:off x="172720" y="2336873"/>
+            <a:ext cx="1989455" cy="3599316"/>
+          </a:xfrm>
+        </p:spPr>
+        <p:txBody>
+          <a:bodyPr vert="horz" lIns="91440" tIns="45720" rIns="91440" bIns="45720" rtlCol="0">
+            <a:normAutofit/>
+          </a:bodyPr>
+          <a:lstStyle/>
+          <a:p>
+            <a:pPr marL="0" indent="0" algn="r">
+              <a:buNone/>
+            </a:pPr>
+            <a:r>
+              <a:rPr lang="en-US" sz="2000" dirty="0"/>
+              <a:t>Fewest movies released at the end of the year with another dip in releases over April &amp; May.</a:t>
+            </a:r>
+          </a:p>
+        </p:txBody>
+      </p:sp>
+      <p:sp>
+        <p:nvSpPr>
+          <p:cNvPr id="4" name="AutoShape 2">
+            <a:extLst>
+              <a:ext uri="{FF2B5EF4-FFF2-40B4-BE49-F238E27FC236}">
+                <a16:creationId xmlns:a16="http://schemas.microsoft.com/office/drawing/2014/main" id="{915CD11D-EE41-4844-B735-E6BDF2CFF963}"/>
+              </a:ext>
+            </a:extLst>
+          </p:cNvPr>
+          <p:cNvSpPr>
+            <a:spLocks noChangeAspect="1" noChangeArrowheads="1"/>
+          </p:cNvSpPr>
+          <p:nvPr/>
+        </p:nvSpPr>
         <p:spPr bwMode="auto">
           <a:xfrm>
-            <a:off x="0" y="5394960"/>
-            <a:ext cx="1463040" cy="1463040"/>
+            <a:off x="5943600" y="3276600"/>
+            <a:ext cx="304800" cy="304800"/>
           </a:xfrm>
           <a:prstGeom prst="rect">
             <a:avLst/>
@@ -10595,11 +10861,458 @@
             </a:ext>
           </a:extLst>
         </p:spPr>
+        <p:txBody>
+          <a:bodyPr vert="horz" wrap="square" lIns="91440" tIns="45720" rIns="91440" bIns="45720" numCol="1" anchor="t" anchorCtr="0" compatLnSpc="1">
+            <a:prstTxWarp prst="textNoShape">
+              <a:avLst/>
+            </a:prstTxWarp>
+          </a:bodyPr>
+          <a:lstStyle/>
+          <a:p>
+            <a:endParaRPr lang="en-US"/>
+          </a:p>
+        </p:txBody>
+      </p:sp>
+      <p:pic>
+        <p:nvPicPr>
+          <p:cNvPr id="29" name="Picture 2">
+            <a:extLst>
+              <a:ext uri="{FF2B5EF4-FFF2-40B4-BE49-F238E27FC236}">
+                <a16:creationId xmlns:a16="http://schemas.microsoft.com/office/drawing/2014/main" id="{E1BC71E5-69CB-4C16-B5EF-4F2E3B91FE1A}"/>
+              </a:ext>
+            </a:extLst>
+          </p:cNvPr>
+          <p:cNvPicPr>
+            <a:picLocks noChangeAspect="1" noChangeArrowheads="1"/>
+          </p:cNvPicPr>
+          <p:nvPr/>
+        </p:nvPicPr>
+        <p:blipFill>
+          <a:blip r:embed="rId5">
+            <a:extLst>
+              <a:ext uri="{28A0092B-C50C-407E-A947-70E740481C1C}">
+                <a14:useLocalDpi xmlns:a14="http://schemas.microsoft.com/office/drawing/2010/main" val="0"/>
+              </a:ext>
+            </a:extLst>
+          </a:blip>
+          <a:srcRect/>
+          <a:stretch>
+            <a:fillRect/>
+          </a:stretch>
+        </p:blipFill>
+        <p:spPr bwMode="auto">
+          <a:xfrm>
+            <a:off x="-19011" y="5247641"/>
+            <a:ext cx="1610360" cy="1610360"/>
+          </a:xfrm>
+          <a:prstGeom prst="rect">
+            <a:avLst/>
+          </a:prstGeom>
+          <a:noFill/>
+          <a:extLst>
+            <a:ext uri="{909E8E84-426E-40DD-AFC4-6F175D3DCCD1}">
+              <a14:hiddenFill xmlns:a14="http://schemas.microsoft.com/office/drawing/2010/main">
+                <a:solidFill>
+                  <a:srgbClr val="FFFFFF"/>
+                </a:solidFill>
+              </a14:hiddenFill>
+            </a:ext>
+          </a:extLst>
+        </p:spPr>
       </p:pic>
+      <p:sp>
+        <p:nvSpPr>
+          <p:cNvPr id="5" name="Rectangle 4">
+            <a:extLst>
+              <a:ext uri="{FF2B5EF4-FFF2-40B4-BE49-F238E27FC236}">
+                <a16:creationId xmlns:a16="http://schemas.microsoft.com/office/drawing/2014/main" id="{7D999403-447F-4912-9921-7852963BAF65}"/>
+              </a:ext>
+            </a:extLst>
+          </p:cNvPr>
+          <p:cNvSpPr/>
+          <p:nvPr/>
+        </p:nvSpPr>
+        <p:spPr>
+          <a:xfrm>
+            <a:off x="1960880" y="609600"/>
+            <a:ext cx="640080" cy="1360640"/>
+          </a:xfrm>
+          <a:prstGeom prst="rect">
+            <a:avLst/>
+          </a:prstGeom>
+          <a:solidFill>
+            <a:schemeClr val="bg1">
+              <a:lumMod val="85000"/>
+              <a:lumOff val="15000"/>
+            </a:schemeClr>
+          </a:solidFill>
+          <a:ln>
+            <a:noFill/>
+          </a:ln>
+        </p:spPr>
+        <p:style>
+          <a:lnRef idx="2">
+            <a:schemeClr val="accent1">
+              <a:shade val="50000"/>
+            </a:schemeClr>
+          </a:lnRef>
+          <a:fillRef idx="1">
+            <a:schemeClr val="accent1"/>
+          </a:fillRef>
+          <a:effectRef idx="0">
+            <a:schemeClr val="accent1"/>
+          </a:effectRef>
+          <a:fontRef idx="minor">
+            <a:schemeClr val="lt1"/>
+          </a:fontRef>
+        </p:style>
+        <p:txBody>
+          <a:bodyPr rtlCol="0" anchor="ctr"/>
+          <a:lstStyle/>
+          <a:p>
+            <a:pPr algn="ctr"/>
+            <a:endParaRPr lang="en-US"/>
+          </a:p>
+        </p:txBody>
+      </p:sp>
+      <p:pic>
+        <p:nvPicPr>
+          <p:cNvPr id="14" name="Picture 13" descr="Chart, bar chart&#10;&#10;Description automatically generated">
+            <a:extLst>
+              <a:ext uri="{FF2B5EF4-FFF2-40B4-BE49-F238E27FC236}">
+                <a16:creationId xmlns:a16="http://schemas.microsoft.com/office/drawing/2014/main" id="{3D8B78C6-F421-4F58-BFB2-444148BECE54}"/>
+              </a:ext>
+            </a:extLst>
+          </p:cNvPr>
+          <p:cNvPicPr>
+            <a:picLocks noChangeAspect="1"/>
+          </p:cNvPicPr>
+          <p:nvPr/>
+        </p:nvPicPr>
+        <p:blipFill>
+          <a:blip r:embed="rId6">
+            <a:extLst>
+              <a:ext uri="{28A0092B-C50C-407E-A947-70E740481C1C}">
+                <a14:useLocalDpi xmlns:a14="http://schemas.microsoft.com/office/drawing/2010/main" val="0"/>
+              </a:ext>
+            </a:extLst>
+          </a:blip>
+          <a:stretch>
+            <a:fillRect/>
+          </a:stretch>
+        </p:blipFill>
+        <p:spPr>
+          <a:xfrm>
+            <a:off x="2768891" y="676494"/>
+            <a:ext cx="9435768" cy="5614281"/>
+          </a:xfrm>
+          <a:prstGeom prst="rect">
+            <a:avLst/>
+          </a:prstGeom>
+          <a:ln>
+            <a:noFill/>
+          </a:ln>
+          <a:effectLst>
+            <a:outerShdw blurRad="76200" dist="63500" dir="5040000" algn="tl" rotWithShape="0">
+              <a:srgbClr val="000000">
+                <a:alpha val="41000"/>
+              </a:srgbClr>
+            </a:outerShdw>
+          </a:effectLst>
+        </p:spPr>
+      </p:pic>
+      <p:sp>
+        <p:nvSpPr>
+          <p:cNvPr id="2" name="Title 1">
+            <a:extLst>
+              <a:ext uri="{FF2B5EF4-FFF2-40B4-BE49-F238E27FC236}">
+                <a16:creationId xmlns:a16="http://schemas.microsoft.com/office/drawing/2014/main" id="{155FB509-870E-4172-B005-4C97A76D0D85}"/>
+              </a:ext>
+            </a:extLst>
+          </p:cNvPr>
+          <p:cNvSpPr>
+            <a:spLocks noGrp="1"/>
+          </p:cNvSpPr>
+          <p:nvPr>
+            <p:ph type="title"/>
+          </p:nvPr>
+        </p:nvSpPr>
+        <p:spPr>
+          <a:xfrm>
+            <a:off x="680321" y="753228"/>
+            <a:ext cx="4136123" cy="1080938"/>
+          </a:xfrm>
+        </p:spPr>
+        <p:txBody>
+          <a:bodyPr vert="horz" lIns="91440" tIns="45720" rIns="91440" bIns="45720" rtlCol="0">
+            <a:normAutofit/>
+          </a:bodyPr>
+          <a:lstStyle/>
+          <a:p>
+            <a:r>
+              <a:rPr lang="en-US" sz="3200" dirty="0"/>
+              <a:t>Results</a:t>
+            </a:r>
+          </a:p>
+        </p:txBody>
+      </p:sp>
+      <p:sp>
+        <p:nvSpPr>
+          <p:cNvPr id="7" name="Rectangle 6">
+            <a:extLst>
+              <a:ext uri="{FF2B5EF4-FFF2-40B4-BE49-F238E27FC236}">
+                <a16:creationId xmlns:a16="http://schemas.microsoft.com/office/drawing/2014/main" id="{649024A9-1CB7-4661-8683-0544237CCD6E}"/>
+              </a:ext>
+            </a:extLst>
+          </p:cNvPr>
+          <p:cNvSpPr/>
+          <p:nvPr/>
+        </p:nvSpPr>
+        <p:spPr>
+          <a:xfrm>
+            <a:off x="2768260" y="-2"/>
+            <a:ext cx="9440442" cy="753230"/>
+          </a:xfrm>
+          <a:prstGeom prst="rect">
+            <a:avLst/>
+          </a:prstGeom>
+          <a:solidFill>
+            <a:schemeClr val="tx1"/>
+          </a:solidFill>
+          <a:ln>
+            <a:noFill/>
+          </a:ln>
+        </p:spPr>
+        <p:style>
+          <a:lnRef idx="2">
+            <a:schemeClr val="accent1">
+              <a:shade val="50000"/>
+            </a:schemeClr>
+          </a:lnRef>
+          <a:fillRef idx="1">
+            <a:schemeClr val="accent1"/>
+          </a:fillRef>
+          <a:effectRef idx="0">
+            <a:schemeClr val="accent1"/>
+          </a:effectRef>
+          <a:fontRef idx="minor">
+            <a:schemeClr val="lt1"/>
+          </a:fontRef>
+        </p:style>
+        <p:txBody>
+          <a:bodyPr rtlCol="0" anchor="ctr"/>
+          <a:lstStyle/>
+          <a:p>
+            <a:pPr algn="ctr"/>
+            <a:endParaRPr lang="en-US"/>
+          </a:p>
+        </p:txBody>
+      </p:sp>
+      <p:sp>
+        <p:nvSpPr>
+          <p:cNvPr id="16" name="Rectangle 15">
+            <a:extLst>
+              <a:ext uri="{FF2B5EF4-FFF2-40B4-BE49-F238E27FC236}">
+                <a16:creationId xmlns:a16="http://schemas.microsoft.com/office/drawing/2014/main" id="{7663D789-2F29-4704-BF20-60C8F0AE2CED}"/>
+              </a:ext>
+            </a:extLst>
+          </p:cNvPr>
+          <p:cNvSpPr/>
+          <p:nvPr/>
+        </p:nvSpPr>
+        <p:spPr>
+          <a:xfrm>
+            <a:off x="2773730" y="6248398"/>
+            <a:ext cx="9440442" cy="753230"/>
+          </a:xfrm>
+          <a:prstGeom prst="rect">
+            <a:avLst/>
+          </a:prstGeom>
+          <a:solidFill>
+            <a:schemeClr val="tx1"/>
+          </a:solidFill>
+          <a:ln>
+            <a:noFill/>
+          </a:ln>
+        </p:spPr>
+        <p:style>
+          <a:lnRef idx="2">
+            <a:schemeClr val="accent1">
+              <a:shade val="50000"/>
+            </a:schemeClr>
+          </a:lnRef>
+          <a:fillRef idx="1">
+            <a:schemeClr val="accent1"/>
+          </a:fillRef>
+          <a:effectRef idx="0">
+            <a:schemeClr val="accent1"/>
+          </a:effectRef>
+          <a:fontRef idx="minor">
+            <a:schemeClr val="lt1"/>
+          </a:fontRef>
+        </p:style>
+        <p:txBody>
+          <a:bodyPr rtlCol="0" anchor="ctr"/>
+          <a:lstStyle/>
+          <a:p>
+            <a:pPr algn="ctr"/>
+            <a:endParaRPr lang="en-US"/>
+          </a:p>
+        </p:txBody>
+      </p:sp>
+      <p:sp>
+        <p:nvSpPr>
+          <p:cNvPr id="18" name="Rectangle 17">
+            <a:extLst>
+              <a:ext uri="{FF2B5EF4-FFF2-40B4-BE49-F238E27FC236}">
+                <a16:creationId xmlns:a16="http://schemas.microsoft.com/office/drawing/2014/main" id="{080289ED-9FA0-4D0C-8041-B4B738E7F74F}"/>
+              </a:ext>
+            </a:extLst>
+          </p:cNvPr>
+          <p:cNvSpPr/>
+          <p:nvPr/>
+        </p:nvSpPr>
+        <p:spPr>
+          <a:xfrm>
+            <a:off x="2510840" y="612915"/>
+            <a:ext cx="640080" cy="1360640"/>
+          </a:xfrm>
+          <a:prstGeom prst="rect">
+            <a:avLst/>
+          </a:prstGeom>
+          <a:solidFill>
+            <a:schemeClr val="bg1">
+              <a:lumMod val="85000"/>
+              <a:lumOff val="15000"/>
+            </a:schemeClr>
+          </a:solidFill>
+          <a:ln>
+            <a:noFill/>
+          </a:ln>
+        </p:spPr>
+        <p:style>
+          <a:lnRef idx="2">
+            <a:schemeClr val="accent1">
+              <a:shade val="50000"/>
+            </a:schemeClr>
+          </a:lnRef>
+          <a:fillRef idx="1">
+            <a:schemeClr val="accent1"/>
+          </a:fillRef>
+          <a:effectRef idx="0">
+            <a:schemeClr val="accent1"/>
+          </a:effectRef>
+          <a:fontRef idx="minor">
+            <a:schemeClr val="lt1"/>
+          </a:fontRef>
+        </p:style>
+        <p:txBody>
+          <a:bodyPr rtlCol="0" anchor="ctr"/>
+          <a:lstStyle/>
+          <a:p>
+            <a:pPr algn="ctr"/>
+            <a:endParaRPr lang="en-US"/>
+          </a:p>
+        </p:txBody>
+      </p:sp>
+      <p:pic>
+        <p:nvPicPr>
+          <p:cNvPr id="20" name="Picture 19">
+            <a:extLst>
+              <a:ext uri="{FF2B5EF4-FFF2-40B4-BE49-F238E27FC236}">
+                <a16:creationId xmlns:a16="http://schemas.microsoft.com/office/drawing/2014/main" id="{5708D27C-68F0-459D-8A2A-679D8E0B73B2}"/>
+              </a:ext>
+            </a:extLst>
+          </p:cNvPr>
+          <p:cNvPicPr>
+            <a:picLocks noChangeAspect="1"/>
+          </p:cNvPicPr>
+          <p:nvPr/>
+        </p:nvPicPr>
+        <p:blipFill>
+          <a:blip r:embed="rId7">
+            <a:extLst>
+              <a:ext uri="{28A0092B-C50C-407E-A947-70E740481C1C}">
+                <a14:useLocalDpi xmlns:a14="http://schemas.microsoft.com/office/drawing/2010/main" val="0"/>
+              </a:ext>
+            </a:extLst>
+          </a:blip>
+          <a:srcRect/>
+          <a:stretch/>
+        </p:blipFill>
+        <p:spPr>
+          <a:xfrm>
+            <a:off x="2447407" y="769"/>
+            <a:ext cx="9885047" cy="6858000"/>
+          </a:xfrm>
+          <a:prstGeom prst="rect">
+            <a:avLst/>
+          </a:prstGeom>
+          <a:ln>
+            <a:noFill/>
+          </a:ln>
+          <a:effectLst/>
+        </p:spPr>
+      </p:pic>
+      <p:sp>
+        <p:nvSpPr>
+          <p:cNvPr id="21" name="Rectangle 20">
+            <a:extLst>
+              <a:ext uri="{FF2B5EF4-FFF2-40B4-BE49-F238E27FC236}">
+                <a16:creationId xmlns:a16="http://schemas.microsoft.com/office/drawing/2014/main" id="{617115CD-BFB1-4723-9ACB-B5B3B148C6B5}"/>
+              </a:ext>
+            </a:extLst>
+          </p:cNvPr>
+          <p:cNvSpPr/>
+          <p:nvPr/>
+        </p:nvSpPr>
+        <p:spPr>
+          <a:xfrm>
+            <a:off x="2428342" y="612146"/>
+            <a:ext cx="640080" cy="1360640"/>
+          </a:xfrm>
+          <a:prstGeom prst="rect">
+            <a:avLst/>
+          </a:prstGeom>
+          <a:solidFill>
+            <a:schemeClr val="bg1">
+              <a:lumMod val="85000"/>
+              <a:lumOff val="15000"/>
+            </a:schemeClr>
+          </a:solidFill>
+          <a:ln>
+            <a:noFill/>
+          </a:ln>
+        </p:spPr>
+        <p:style>
+          <a:lnRef idx="2">
+            <a:schemeClr val="accent1">
+              <a:shade val="50000"/>
+            </a:schemeClr>
+          </a:lnRef>
+          <a:fillRef idx="1">
+            <a:schemeClr val="accent1"/>
+          </a:fillRef>
+          <a:effectRef idx="0">
+            <a:schemeClr val="accent1"/>
+          </a:effectRef>
+          <a:fontRef idx="minor">
+            <a:schemeClr val="lt1"/>
+          </a:fontRef>
+        </p:style>
+        <p:txBody>
+          <a:bodyPr rtlCol="0" anchor="ctr"/>
+          <a:lstStyle/>
+          <a:p>
+            <a:pPr algn="ctr"/>
+            <a:endParaRPr lang="en-US"/>
+          </a:p>
+        </p:txBody>
+      </p:sp>
     </p:spTree>
     <p:extLst>
       <p:ext uri="{BB962C8B-B14F-4D97-AF65-F5344CB8AC3E}">
-        <p14:creationId xmlns:p14="http://schemas.microsoft.com/office/powerpoint/2010/main" val="2246876738"/>
+        <p14:creationId xmlns:p14="http://schemas.microsoft.com/office/powerpoint/2010/main" val="1410323614"/>
       </p:ext>
     </p:extLst>
   </p:cSld>
@@ -10631,6 +11344,159 @@
           <p:cNvPr id="2" name="Title 1">
             <a:extLst>
               <a:ext uri="{FF2B5EF4-FFF2-40B4-BE49-F238E27FC236}">
+                <a16:creationId xmlns:a16="http://schemas.microsoft.com/office/drawing/2014/main" id="{A32C2566-E304-4158-B0FF-3108A45C2C46}"/>
+              </a:ext>
+            </a:extLst>
+          </p:cNvPr>
+          <p:cNvSpPr>
+            <a:spLocks noGrp="1"/>
+          </p:cNvSpPr>
+          <p:nvPr>
+            <p:ph type="title"/>
+          </p:nvPr>
+        </p:nvSpPr>
+        <p:spPr/>
+        <p:txBody>
+          <a:bodyPr/>
+          <a:lstStyle/>
+          <a:p>
+            <a:r>
+              <a:rPr lang="en-US" dirty="0"/>
+              <a:t>Conclusions</a:t>
+            </a:r>
+          </a:p>
+        </p:txBody>
+      </p:sp>
+      <p:sp>
+        <p:nvSpPr>
+          <p:cNvPr id="3" name="Content Placeholder 2">
+            <a:extLst>
+              <a:ext uri="{FF2B5EF4-FFF2-40B4-BE49-F238E27FC236}">
+                <a16:creationId xmlns:a16="http://schemas.microsoft.com/office/drawing/2014/main" id="{9BCBE210-1392-4176-9960-1E409D18DFF9}"/>
+              </a:ext>
+            </a:extLst>
+          </p:cNvPr>
+          <p:cNvSpPr>
+            <a:spLocks noGrp="1"/>
+          </p:cNvSpPr>
+          <p:nvPr>
+            <p:ph idx="1"/>
+          </p:nvPr>
+        </p:nvSpPr>
+        <p:spPr/>
+        <p:txBody>
+          <a:bodyPr>
+            <a:normAutofit/>
+          </a:bodyPr>
+          <a:lstStyle/>
+          <a:p>
+            <a:r>
+              <a:rPr lang="en-US" dirty="0"/>
+              <a:t>Prioritize the best return for their investment to ensure revenue for future products.</a:t>
+            </a:r>
+          </a:p>
+          <a:p>
+            <a:endParaRPr lang="en-US" dirty="0"/>
+          </a:p>
+          <a:p>
+            <a:r>
+              <a:rPr lang="en-US" dirty="0"/>
+              <a:t>Direct competition with established studios should focus on the Thriller genre.</a:t>
+            </a:r>
+          </a:p>
+          <a:p>
+            <a:endParaRPr lang="en-US" dirty="0"/>
+          </a:p>
+          <a:p>
+            <a:r>
+              <a:rPr lang="en-US" dirty="0"/>
+              <a:t>Take advantage of end of year and late spring release lulls to maximize visibility of product. </a:t>
+            </a:r>
+          </a:p>
+        </p:txBody>
+      </p:sp>
+      <p:pic>
+        <p:nvPicPr>
+          <p:cNvPr id="4" name="Picture 2">
+            <a:extLst>
+              <a:ext uri="{FF2B5EF4-FFF2-40B4-BE49-F238E27FC236}">
+                <a16:creationId xmlns:a16="http://schemas.microsoft.com/office/drawing/2014/main" id="{DCD4BD71-CC9B-4FA1-ABEC-15E9B2FA3AA2}"/>
+              </a:ext>
+            </a:extLst>
+          </p:cNvPr>
+          <p:cNvPicPr>
+            <a:picLocks noChangeAspect="1" noChangeArrowheads="1"/>
+          </p:cNvPicPr>
+          <p:nvPr/>
+        </p:nvPicPr>
+        <p:blipFill>
+          <a:blip r:embed="rId3">
+            <a:extLst>
+              <a:ext uri="{28A0092B-C50C-407E-A947-70E740481C1C}">
+                <a14:useLocalDpi xmlns:a14="http://schemas.microsoft.com/office/drawing/2010/main" val="0"/>
+              </a:ext>
+            </a:extLst>
+          </a:blip>
+          <a:srcRect/>
+          <a:stretch>
+            <a:fillRect/>
+          </a:stretch>
+        </p:blipFill>
+        <p:spPr bwMode="auto">
+          <a:xfrm>
+            <a:off x="0" y="5394960"/>
+            <a:ext cx="1463040" cy="1463040"/>
+          </a:xfrm>
+          <a:prstGeom prst="rect">
+            <a:avLst/>
+          </a:prstGeom>
+          <a:noFill/>
+          <a:extLst>
+            <a:ext uri="{909E8E84-426E-40DD-AFC4-6F175D3DCCD1}">
+              <a14:hiddenFill xmlns:a14="http://schemas.microsoft.com/office/drawing/2010/main">
+                <a:solidFill>
+                  <a:srgbClr val="FFFFFF"/>
+                </a:solidFill>
+              </a14:hiddenFill>
+            </a:ext>
+          </a:extLst>
+        </p:spPr>
+      </p:pic>
+    </p:spTree>
+    <p:extLst>
+      <p:ext uri="{BB962C8B-B14F-4D97-AF65-F5344CB8AC3E}">
+        <p14:creationId xmlns:p14="http://schemas.microsoft.com/office/powerpoint/2010/main" val="2246876738"/>
+      </p:ext>
+    </p:extLst>
+  </p:cSld>
+  <p:clrMapOvr>
+    <a:masterClrMapping/>
+  </p:clrMapOvr>
+</p:sld>
+</file>
+
+<file path=ppt/slides/slide13.xml><?xml version="1.0" encoding="utf-8"?>
+<p:sld xmlns:a="http://schemas.openxmlformats.org/drawingml/2006/main" xmlns:r="http://schemas.openxmlformats.org/officeDocument/2006/relationships" xmlns:p="http://schemas.openxmlformats.org/presentationml/2006/main">
+  <p:cSld>
+    <p:spTree>
+      <p:nvGrpSpPr>
+        <p:cNvPr id="1" name=""/>
+        <p:cNvGrpSpPr/>
+        <p:nvPr/>
+      </p:nvGrpSpPr>
+      <p:grpSpPr>
+        <a:xfrm>
+          <a:off x="0" y="0"/>
+          <a:ext cx="0" cy="0"/>
+          <a:chOff x="0" y="0"/>
+          <a:chExt cx="0" cy="0"/>
+        </a:xfrm>
+      </p:grpSpPr>
+      <p:sp>
+        <p:nvSpPr>
+          <p:cNvPr id="2" name="Title 1">
+            <a:extLst>
+              <a:ext uri="{FF2B5EF4-FFF2-40B4-BE49-F238E27FC236}">
                 <a16:creationId xmlns:a16="http://schemas.microsoft.com/office/drawing/2014/main" id="{C94B4B5E-84F5-4E86-822A-D010FD3DB8DC}"/>
               </a:ext>
             </a:extLst>
@@ -10763,7 +11629,164 @@
 </p:sld>
 </file>
 
-<file path=ppt/slides/slide13.xml><?xml version="1.0" encoding="utf-8"?>
+<file path=ppt/slides/slide14.xml><?xml version="1.0" encoding="utf-8"?>
+<p:sld xmlns:a="http://schemas.openxmlformats.org/drawingml/2006/main" xmlns:r="http://schemas.openxmlformats.org/officeDocument/2006/relationships" xmlns:p="http://schemas.openxmlformats.org/presentationml/2006/main">
+  <p:cSld>
+    <p:spTree>
+      <p:nvGrpSpPr>
+        <p:cNvPr id="1" name=""/>
+        <p:cNvGrpSpPr/>
+        <p:nvPr/>
+      </p:nvGrpSpPr>
+      <p:grpSpPr>
+        <a:xfrm>
+          <a:off x="0" y="0"/>
+          <a:ext cx="0" cy="0"/>
+          <a:chOff x="0" y="0"/>
+          <a:chExt cx="0" cy="0"/>
+        </a:xfrm>
+      </p:grpSpPr>
+      <p:sp>
+        <p:nvSpPr>
+          <p:cNvPr id="2" name="Title 1">
+            <a:extLst>
+              <a:ext uri="{FF2B5EF4-FFF2-40B4-BE49-F238E27FC236}">
+                <a16:creationId xmlns:a16="http://schemas.microsoft.com/office/drawing/2014/main" id="{A32C2566-E304-4158-B0FF-3108A45C2C46}"/>
+              </a:ext>
+            </a:extLst>
+          </p:cNvPr>
+          <p:cNvSpPr>
+            <a:spLocks noGrp="1"/>
+          </p:cNvSpPr>
+          <p:nvPr>
+            <p:ph type="title"/>
+          </p:nvPr>
+        </p:nvSpPr>
+        <p:spPr/>
+        <p:txBody>
+          <a:bodyPr/>
+          <a:lstStyle/>
+          <a:p>
+            <a:r>
+              <a:rPr lang="en-US" dirty="0"/>
+              <a:t>Conclusions</a:t>
+            </a:r>
+          </a:p>
+        </p:txBody>
+      </p:sp>
+      <p:sp>
+        <p:nvSpPr>
+          <p:cNvPr id="3" name="Content Placeholder 2">
+            <a:extLst>
+              <a:ext uri="{FF2B5EF4-FFF2-40B4-BE49-F238E27FC236}">
+                <a16:creationId xmlns:a16="http://schemas.microsoft.com/office/drawing/2014/main" id="{9BCBE210-1392-4176-9960-1E409D18DFF9}"/>
+              </a:ext>
+            </a:extLst>
+          </p:cNvPr>
+          <p:cNvSpPr>
+            <a:spLocks noGrp="1"/>
+          </p:cNvSpPr>
+          <p:nvPr>
+            <p:ph idx="1"/>
+          </p:nvPr>
+        </p:nvSpPr>
+        <p:spPr/>
+        <p:txBody>
+          <a:bodyPr>
+            <a:normAutofit fontScale="92500"/>
+          </a:bodyPr>
+          <a:lstStyle/>
+          <a:p>
+            <a:r>
+              <a:rPr lang="en-US" dirty="0"/>
+              <a:t>As a new production company, Microsoft should focus on the best return for their investment. This will ensure revenue for future products.</a:t>
+            </a:r>
+          </a:p>
+          <a:p>
+            <a:endParaRPr lang="en-US" dirty="0"/>
+          </a:p>
+          <a:p>
+            <a:r>
+              <a:rPr lang="en-US" dirty="0"/>
+              <a:t>Direct competition with established studios should focus on the Thriller genre.</a:t>
+            </a:r>
+          </a:p>
+          <a:p>
+            <a:pPr lvl="1"/>
+            <a:endParaRPr lang="en-US" dirty="0"/>
+          </a:p>
+          <a:p>
+            <a:r>
+              <a:rPr lang="en-US" dirty="0"/>
+              <a:t>Release schedule should take advantage of end of year and late spring lulls in order to maximize visibility of product. Limited competition requires decreased marketing budget for these offerings. </a:t>
+            </a:r>
+          </a:p>
+          <a:p>
+            <a:endParaRPr lang="en-US" dirty="0"/>
+          </a:p>
+        </p:txBody>
+      </p:sp>
+      <p:pic>
+        <p:nvPicPr>
+          <p:cNvPr id="4" name="Picture 2">
+            <a:extLst>
+              <a:ext uri="{FF2B5EF4-FFF2-40B4-BE49-F238E27FC236}">
+                <a16:creationId xmlns:a16="http://schemas.microsoft.com/office/drawing/2014/main" id="{DCD4BD71-CC9B-4FA1-ABEC-15E9B2FA3AA2}"/>
+              </a:ext>
+            </a:extLst>
+          </p:cNvPr>
+          <p:cNvPicPr>
+            <a:picLocks noChangeAspect="1" noChangeArrowheads="1"/>
+          </p:cNvPicPr>
+          <p:nvPr/>
+        </p:nvPicPr>
+        <p:blipFill>
+          <a:blip r:embed="rId3">
+            <a:extLst>
+              <a:ext uri="{28A0092B-C50C-407E-A947-70E740481C1C}">
+                <a14:useLocalDpi xmlns:a14="http://schemas.microsoft.com/office/drawing/2010/main" val="0"/>
+              </a:ext>
+            </a:extLst>
+          </a:blip>
+          <a:srcRect/>
+          <a:stretch>
+            <a:fillRect/>
+          </a:stretch>
+        </p:blipFill>
+        <p:spPr bwMode="auto">
+          <a:xfrm>
+            <a:off x="0" y="5394960"/>
+            <a:ext cx="1463040" cy="1463040"/>
+          </a:xfrm>
+          <a:prstGeom prst="rect">
+            <a:avLst/>
+          </a:prstGeom>
+          <a:noFill/>
+          <a:extLst>
+            <a:ext uri="{909E8E84-426E-40DD-AFC4-6F175D3DCCD1}">
+              <a14:hiddenFill xmlns:a14="http://schemas.microsoft.com/office/drawing/2010/main">
+                <a:solidFill>
+                  <a:srgbClr val="FFFFFF"/>
+                </a:solidFill>
+              </a14:hiddenFill>
+            </a:ext>
+          </a:extLst>
+        </p:spPr>
+      </p:pic>
+    </p:spTree>
+    <p:extLst>
+      <p:ext uri="{BB962C8B-B14F-4D97-AF65-F5344CB8AC3E}">
+        <p14:creationId xmlns:p14="http://schemas.microsoft.com/office/powerpoint/2010/main" val="1673438053"/>
+      </p:ext>
+    </p:extLst>
+  </p:cSld>
+  <p:clrMapOvr>
+    <a:masterClrMapping/>
+  </p:clrMapOvr>
+</p:sld>
+</file>
+
+<file path=ppt/slides/slide15.xml><?xml version="1.0" encoding="utf-8"?>
 <p:sld xmlns:a="http://schemas.openxmlformats.org/drawingml/2006/main" xmlns:r="http://schemas.openxmlformats.org/officeDocument/2006/relationships" xmlns:p="http://schemas.openxmlformats.org/presentationml/2006/main">
   <p:cSld>
     <p:bg>
@@ -11448,9 +12471,29 @@
               <a:buChar char="•"/>
             </a:pPr>
             <a:r>
-              <a:rPr lang="en-US" sz="2800" dirty="0"/>
-              <a:t>Alex Marshall</a:t>
+              <a:rPr lang="en-US" sz="2800" dirty="0">
+                <a:solidFill>
+                  <a:schemeClr val="tx1">
+                    <a:lumMod val="95000"/>
+                  </a:schemeClr>
+                </a:solidFill>
+                <a:hlinkClick r:id="rId5">
+                  <a:extLst>
+                    <a:ext uri="{A12FA001-AC4F-418D-AE19-62706E023703}">
+                      <ahyp:hlinkClr xmlns:ahyp="http://schemas.microsoft.com/office/drawing/2018/hyperlinkcolor" val="tx"/>
+                    </a:ext>
+                  </a:extLst>
+                </a:hlinkClick>
+              </a:rPr>
+              <a:t>Alexandra Marshall</a:t>
             </a:r>
+            <a:endParaRPr lang="en-US" sz="2800" dirty="0">
+              <a:solidFill>
+                <a:schemeClr val="tx1">
+                  <a:lumMod val="95000"/>
+                </a:schemeClr>
+              </a:solidFill>
+            </a:endParaRPr>
           </a:p>
           <a:p>
             <a:pPr indent="-228600" defTabSz="914400">
@@ -11463,10 +12506,32 @@
               <a:buFont typeface="Arial" panose="020B0604020202020204" pitchFamily="34" charset="0"/>
               <a:buChar char="•"/>
             </a:pPr>
-            <a:r>
-              <a:rPr lang="en-US" sz="2800" dirty="0"/>
-              <a:t>&lt;LINKED IN&gt;</a:t>
-            </a:r>
+            <a:endParaRPr lang="en-US" sz="2800" dirty="0">
+              <a:solidFill>
+                <a:schemeClr val="tx1">
+                  <a:lumMod val="95000"/>
+                </a:schemeClr>
+              </a:solidFill>
+            </a:endParaRPr>
+          </a:p>
+          <a:p>
+            <a:pPr indent="-228600" defTabSz="914400">
+              <a:lnSpc>
+                <a:spcPct val="90000"/>
+              </a:lnSpc>
+              <a:spcAft>
+                <a:spcPts val="600"/>
+              </a:spcAft>
+              <a:buFont typeface="Arial" panose="020B0604020202020204" pitchFamily="34" charset="0"/>
+              <a:buChar char="•"/>
+            </a:pPr>
+            <a:endParaRPr lang="en-US" sz="2800" dirty="0">
+              <a:solidFill>
+                <a:schemeClr val="tx1">
+                  <a:lumMod val="95000"/>
+                </a:schemeClr>
+              </a:solidFill>
+            </a:endParaRPr>
           </a:p>
           <a:p>
             <a:pPr indent="-228600" defTabSz="914400">
@@ -11481,79 +12546,441 @@
             </a:pPr>
             <a:endParaRPr lang="en-US" sz="2800" dirty="0"/>
           </a:p>
-          <a:p>
-            <a:pPr indent="-228600" defTabSz="914400">
-              <a:lnSpc>
-                <a:spcPct val="90000"/>
-              </a:lnSpc>
-              <a:spcAft>
-                <a:spcPts val="600"/>
-              </a:spcAft>
-              <a:buFont typeface="Arial" panose="020B0604020202020204" pitchFamily="34" charset="0"/>
-              <a:buChar char="•"/>
-            </a:pPr>
-            <a:r>
-              <a:rPr lang="en-US" sz="2800" dirty="0"/>
-              <a:t>Jennifer Cobb</a:t>
-            </a:r>
-          </a:p>
-          <a:p>
-            <a:pPr indent="-228600" defTabSz="914400">
-              <a:lnSpc>
-                <a:spcPct val="90000"/>
-              </a:lnSpc>
-              <a:spcAft>
-                <a:spcPts val="600"/>
-              </a:spcAft>
-              <a:buFont typeface="Arial" panose="020B0604020202020204" pitchFamily="34" charset="0"/>
-              <a:buChar char="•"/>
-            </a:pPr>
-            <a:r>
-              <a:rPr lang="en-US" sz="2800" dirty="0"/>
-              <a:t>&lt;LINKED IN&gt;</a:t>
-            </a:r>
-          </a:p>
-        </p:txBody>
-      </p:sp>
-      <p:pic>
-        <p:nvPicPr>
-          <p:cNvPr id="4" name="Picture 3">
+        </p:txBody>
+      </p:sp>
+      <p:grpSp>
+        <p:nvGrpSpPr>
+          <p:cNvPr id="45" name="Group 44">
             <a:extLst>
               <a:ext uri="{FF2B5EF4-FFF2-40B4-BE49-F238E27FC236}">
-                <a16:creationId xmlns:a16="http://schemas.microsoft.com/office/drawing/2014/main" id="{F8EE110D-CF7D-4936-A00A-3C9255AB77D9}"/>
+                <a16:creationId xmlns:a16="http://schemas.microsoft.com/office/drawing/2014/main" id="{001D3C93-26BD-46F7-A4AC-E2B1D1EA6F3B}"/>
               </a:ext>
             </a:extLst>
           </p:cNvPr>
-          <p:cNvPicPr>
-            <a:picLocks noChangeAspect="1"/>
-          </p:cNvPicPr>
+          <p:cNvGrpSpPr/>
           <p:nvPr/>
-        </p:nvPicPr>
-        <p:blipFill rotWithShape="1">
-          <a:blip r:embed="rId5"/>
-          <a:srcRect l="1086" r="2330"/>
-          <a:stretch/>
-        </p:blipFill>
-        <p:spPr>
-          <a:xfrm>
-            <a:off x="5456319" y="1219009"/>
-            <a:ext cx="6055360" cy="4419982"/>
-          </a:xfrm>
-          <a:prstGeom prst="rect">
-            <a:avLst/>
-          </a:prstGeom>
-          <a:ln>
+        </p:nvGrpSpPr>
+        <p:grpSpPr>
+          <a:xfrm>
+            <a:off x="5443828" y="1272537"/>
+            <a:ext cx="6253364" cy="4312924"/>
+            <a:chOff x="1165858" y="1240787"/>
+            <a:chExt cx="6253364" cy="4312924"/>
+          </a:xfrm>
+        </p:grpSpPr>
+        <p:grpSp>
+          <p:nvGrpSpPr>
+            <p:cNvPr id="46" name="Group 45">
+              <a:extLst>
+                <a:ext uri="{FF2B5EF4-FFF2-40B4-BE49-F238E27FC236}">
+                  <a16:creationId xmlns:a16="http://schemas.microsoft.com/office/drawing/2014/main" id="{23E91554-80A3-4C43-8176-138AEF5CCC3D}"/>
+                </a:ext>
+              </a:extLst>
+            </p:cNvPr>
+            <p:cNvGrpSpPr/>
+            <p:nvPr/>
+          </p:nvGrpSpPr>
+          <p:grpSpPr>
+            <a:xfrm>
+              <a:off x="1165858" y="1240787"/>
+              <a:ext cx="6096000" cy="4312924"/>
+              <a:chOff x="1165858" y="1240787"/>
+              <a:chExt cx="6096000" cy="4312924"/>
+            </a:xfrm>
+          </p:grpSpPr>
+          <p:sp>
+            <p:nvSpPr>
+              <p:cNvPr id="48" name="Rectangle 47">
+                <a:extLst>
+                  <a:ext uri="{FF2B5EF4-FFF2-40B4-BE49-F238E27FC236}">
+                    <a16:creationId xmlns:a16="http://schemas.microsoft.com/office/drawing/2014/main" id="{261044C2-50C2-4835-B2D1-C42D3C9BC494}"/>
+                  </a:ext>
+                </a:extLst>
+              </p:cNvPr>
+              <p:cNvSpPr/>
+              <p:nvPr/>
+            </p:nvSpPr>
+            <p:spPr>
+              <a:xfrm>
+                <a:off x="1165858" y="1240787"/>
+                <a:ext cx="6096000" cy="4312924"/>
+              </a:xfrm>
+              <a:prstGeom prst="rect">
+                <a:avLst/>
+              </a:prstGeom>
+              <a:solidFill>
+                <a:srgbClr val="0F4951"/>
+              </a:solidFill>
+            </p:spPr>
+            <p:style>
+              <a:lnRef idx="2">
+                <a:schemeClr val="accent1">
+                  <a:shade val="50000"/>
+                </a:schemeClr>
+              </a:lnRef>
+              <a:fillRef idx="1">
+                <a:schemeClr val="accent1"/>
+              </a:fillRef>
+              <a:effectRef idx="0">
+                <a:schemeClr val="accent1"/>
+              </a:effectRef>
+              <a:fontRef idx="minor">
+                <a:schemeClr val="lt1"/>
+              </a:fontRef>
+            </p:style>
+            <p:txBody>
+              <a:bodyPr rtlCol="0" anchor="ctr"/>
+              <a:lstStyle/>
+              <a:p>
+                <a:pPr algn="ctr"/>
+                <a:r>
+                  <a:rPr lang="en-US" dirty="0"/>
+                  <a:t>NE</a:t>
+                </a:r>
+              </a:p>
+            </p:txBody>
+          </p:sp>
+          <p:grpSp>
+            <p:nvGrpSpPr>
+              <p:cNvPr id="49" name="Group 48">
+                <a:extLst>
+                  <a:ext uri="{FF2B5EF4-FFF2-40B4-BE49-F238E27FC236}">
+                    <a16:creationId xmlns:a16="http://schemas.microsoft.com/office/drawing/2014/main" id="{7BF4BDE2-9EB1-4010-B28B-07C1F00B01DF}"/>
+                  </a:ext>
+                </a:extLst>
+              </p:cNvPr>
+              <p:cNvGrpSpPr/>
+              <p:nvPr/>
+            </p:nvGrpSpPr>
+            <p:grpSpPr>
+              <a:xfrm>
+                <a:off x="3213735" y="1482089"/>
+                <a:ext cx="2011680" cy="3830320"/>
+                <a:chOff x="3213735" y="1304289"/>
+                <a:chExt cx="2011680" cy="3830320"/>
+              </a:xfrm>
+              <a:solidFill>
+                <a:srgbClr val="53AD8D"/>
+              </a:solidFill>
+            </p:grpSpPr>
+            <p:grpSp>
+              <p:nvGrpSpPr>
+                <p:cNvPr id="50" name="Group 49">
+                  <a:extLst>
+                    <a:ext uri="{FF2B5EF4-FFF2-40B4-BE49-F238E27FC236}">
+                      <a16:creationId xmlns:a16="http://schemas.microsoft.com/office/drawing/2014/main" id="{F6365079-80FA-4200-9CD9-B16A7CC964C9}"/>
+                    </a:ext>
+                  </a:extLst>
+                </p:cNvPr>
+                <p:cNvGrpSpPr/>
+                <p:nvPr/>
+              </p:nvGrpSpPr>
+              <p:grpSpPr>
+                <a:xfrm>
+                  <a:off x="3213735" y="1304289"/>
+                  <a:ext cx="2011680" cy="2428241"/>
+                  <a:chOff x="3048000" y="1168400"/>
+                  <a:chExt cx="2011680" cy="2428241"/>
+                </a:xfrm>
+                <a:grpFill/>
+              </p:grpSpPr>
+              <p:sp>
+                <p:nvSpPr>
+                  <p:cNvPr id="52" name="Isosceles Triangle 51">
+                    <a:extLst>
+                      <a:ext uri="{FF2B5EF4-FFF2-40B4-BE49-F238E27FC236}">
+                        <a16:creationId xmlns:a16="http://schemas.microsoft.com/office/drawing/2014/main" id="{6783CB93-263C-4198-B349-A45AEF2743F5}"/>
+                      </a:ext>
+                    </a:extLst>
+                  </p:cNvPr>
+                  <p:cNvSpPr/>
+                  <p:nvPr/>
+                </p:nvSpPr>
+                <p:spPr>
+                  <a:xfrm>
+                    <a:off x="3876675" y="1168400"/>
+                    <a:ext cx="342900" cy="2092960"/>
+                  </a:xfrm>
+                  <a:prstGeom prst="triangle">
+                    <a:avLst/>
+                  </a:prstGeom>
+                  <a:grpFill/>
+                  <a:ln>
+                    <a:noFill/>
+                  </a:ln>
+                </p:spPr>
+                <p:style>
+                  <a:lnRef idx="2">
+                    <a:schemeClr val="accent1">
+                      <a:shade val="50000"/>
+                    </a:schemeClr>
+                  </a:lnRef>
+                  <a:fillRef idx="1">
+                    <a:schemeClr val="accent1"/>
+                  </a:fillRef>
+                  <a:effectRef idx="0">
+                    <a:schemeClr val="accent1"/>
+                  </a:effectRef>
+                  <a:fontRef idx="minor">
+                    <a:schemeClr val="lt1"/>
+                  </a:fontRef>
+                </p:style>
+                <p:txBody>
+                  <a:bodyPr rtlCol="0" anchor="ctr"/>
+                  <a:lstStyle/>
+                  <a:p>
+                    <a:pPr algn="ctr"/>
+                    <a:endParaRPr lang="en-US"/>
+                  </a:p>
+                </p:txBody>
+              </p:sp>
+              <p:sp>
+                <p:nvSpPr>
+                  <p:cNvPr id="53" name="Isosceles Triangle 52">
+                    <a:extLst>
+                      <a:ext uri="{FF2B5EF4-FFF2-40B4-BE49-F238E27FC236}">
+                        <a16:creationId xmlns:a16="http://schemas.microsoft.com/office/drawing/2014/main" id="{9F06A7ED-8150-49F4-BF91-B3FFF2528BB6}"/>
+                      </a:ext>
+                    </a:extLst>
+                  </p:cNvPr>
+                  <p:cNvSpPr/>
+                  <p:nvPr/>
+                </p:nvSpPr>
+                <p:spPr>
+                  <a:xfrm>
+                    <a:off x="3048000" y="1524000"/>
+                    <a:ext cx="342900" cy="1737360"/>
+                  </a:xfrm>
+                  <a:prstGeom prst="triangle">
+                    <a:avLst/>
+                  </a:prstGeom>
+                  <a:grpFill/>
+                  <a:ln>
+                    <a:noFill/>
+                  </a:ln>
+                </p:spPr>
+                <p:style>
+                  <a:lnRef idx="2">
+                    <a:schemeClr val="accent1">
+                      <a:shade val="50000"/>
+                    </a:schemeClr>
+                  </a:lnRef>
+                  <a:fillRef idx="1">
+                    <a:schemeClr val="accent1"/>
+                  </a:fillRef>
+                  <a:effectRef idx="0">
+                    <a:schemeClr val="accent1"/>
+                  </a:effectRef>
+                  <a:fontRef idx="minor">
+                    <a:schemeClr val="lt1"/>
+                  </a:fontRef>
+                </p:style>
+                <p:txBody>
+                  <a:bodyPr rtlCol="0" anchor="ctr"/>
+                  <a:lstStyle/>
+                  <a:p>
+                    <a:pPr algn="ctr"/>
+                    <a:endParaRPr lang="en-US"/>
+                  </a:p>
+                </p:txBody>
+              </p:sp>
+              <p:sp>
+                <p:nvSpPr>
+                  <p:cNvPr id="54" name="Isosceles Triangle 53">
+                    <a:extLst>
+                      <a:ext uri="{FF2B5EF4-FFF2-40B4-BE49-F238E27FC236}">
+                        <a16:creationId xmlns:a16="http://schemas.microsoft.com/office/drawing/2014/main" id="{FDCB9B71-CAB1-48F2-80CC-EF017E50E9ED}"/>
+                      </a:ext>
+                    </a:extLst>
+                  </p:cNvPr>
+                  <p:cNvSpPr/>
+                  <p:nvPr/>
+                </p:nvSpPr>
+                <p:spPr>
+                  <a:xfrm>
+                    <a:off x="4716780" y="1524000"/>
+                    <a:ext cx="342900" cy="1737360"/>
+                  </a:xfrm>
+                  <a:prstGeom prst="triangle">
+                    <a:avLst/>
+                  </a:prstGeom>
+                  <a:grpFill/>
+                  <a:ln>
+                    <a:noFill/>
+                  </a:ln>
+                </p:spPr>
+                <p:style>
+                  <a:lnRef idx="2">
+                    <a:schemeClr val="accent1">
+                      <a:shade val="50000"/>
+                    </a:schemeClr>
+                  </a:lnRef>
+                  <a:fillRef idx="1">
+                    <a:schemeClr val="accent1"/>
+                  </a:fillRef>
+                  <a:effectRef idx="0">
+                    <a:schemeClr val="accent1"/>
+                  </a:effectRef>
+                  <a:fontRef idx="minor">
+                    <a:schemeClr val="lt1"/>
+                  </a:fontRef>
+                </p:style>
+                <p:txBody>
+                  <a:bodyPr rtlCol="0" anchor="ctr"/>
+                  <a:lstStyle/>
+                  <a:p>
+                    <a:pPr algn="ctr"/>
+                    <a:endParaRPr lang="en-US"/>
+                  </a:p>
+                </p:txBody>
+              </p:sp>
+              <p:sp>
+                <p:nvSpPr>
+                  <p:cNvPr id="55" name="Isosceles Triangle 54">
+                    <a:extLst>
+                      <a:ext uri="{FF2B5EF4-FFF2-40B4-BE49-F238E27FC236}">
+                        <a16:creationId xmlns:a16="http://schemas.microsoft.com/office/drawing/2014/main" id="{23D27605-0657-4303-A47A-D9AEB04AB0E9}"/>
+                      </a:ext>
+                    </a:extLst>
+                  </p:cNvPr>
+                  <p:cNvSpPr/>
+                  <p:nvPr/>
+                </p:nvSpPr>
+                <p:spPr>
+                  <a:xfrm rot="10800000">
+                    <a:off x="3048000" y="3261360"/>
+                    <a:ext cx="2011680" cy="335281"/>
+                  </a:xfrm>
+                  <a:prstGeom prst="triangle">
+                    <a:avLst/>
+                  </a:prstGeom>
+                  <a:grpFill/>
+                  <a:ln>
+                    <a:noFill/>
+                  </a:ln>
+                </p:spPr>
+                <p:style>
+                  <a:lnRef idx="2">
+                    <a:schemeClr val="accent1">
+                      <a:shade val="50000"/>
+                    </a:schemeClr>
+                  </a:lnRef>
+                  <a:fillRef idx="1">
+                    <a:schemeClr val="accent1"/>
+                  </a:fillRef>
+                  <a:effectRef idx="0">
+                    <a:schemeClr val="accent1"/>
+                  </a:effectRef>
+                  <a:fontRef idx="minor">
+                    <a:schemeClr val="lt1"/>
+                  </a:fontRef>
+                </p:style>
+                <p:txBody>
+                  <a:bodyPr rtlCol="0" anchor="ctr"/>
+                  <a:lstStyle/>
+                  <a:p>
+                    <a:pPr algn="ctr"/>
+                    <a:endParaRPr lang="en-US"/>
+                  </a:p>
+                </p:txBody>
+              </p:sp>
+            </p:grpSp>
+            <p:sp>
+              <p:nvSpPr>
+                <p:cNvPr id="51" name="Isosceles Triangle 50">
+                  <a:extLst>
+                    <a:ext uri="{FF2B5EF4-FFF2-40B4-BE49-F238E27FC236}">
+                      <a16:creationId xmlns:a16="http://schemas.microsoft.com/office/drawing/2014/main" id="{001E9D27-26B9-4E5E-9622-5A47ECACCBFA}"/>
+                    </a:ext>
+                  </a:extLst>
+                </p:cNvPr>
+                <p:cNvSpPr/>
+                <p:nvPr/>
+              </p:nvSpPr>
+              <p:spPr>
+                <a:xfrm rot="10800000">
+                  <a:off x="4042409" y="3564890"/>
+                  <a:ext cx="342900" cy="1569719"/>
+                </a:xfrm>
+                <a:prstGeom prst="triangle">
+                  <a:avLst/>
+                </a:prstGeom>
+                <a:grpFill/>
+                <a:ln>
+                  <a:noFill/>
+                </a:ln>
+              </p:spPr>
+              <p:style>
+                <a:lnRef idx="2">
+                  <a:schemeClr val="accent1">
+                    <a:shade val="50000"/>
+                  </a:schemeClr>
+                </a:lnRef>
+                <a:fillRef idx="1">
+                  <a:schemeClr val="accent1"/>
+                </a:fillRef>
+                <a:effectRef idx="0">
+                  <a:schemeClr val="accent1"/>
+                </a:effectRef>
+                <a:fontRef idx="minor">
+                  <a:schemeClr val="lt1"/>
+                </a:fontRef>
+              </p:style>
+              <p:txBody>
+                <a:bodyPr rtlCol="0" anchor="ctr"/>
+                <a:lstStyle/>
+                <a:p>
+                  <a:pPr algn="ctr"/>
+                  <a:endParaRPr lang="en-US"/>
+                </a:p>
+              </p:txBody>
+            </p:sp>
+          </p:grpSp>
+        </p:grpSp>
+        <p:sp>
+          <p:nvSpPr>
+            <p:cNvPr id="47" name="TextBox 46">
+              <a:extLst>
+                <a:ext uri="{FF2B5EF4-FFF2-40B4-BE49-F238E27FC236}">
+                  <a16:creationId xmlns:a16="http://schemas.microsoft.com/office/drawing/2014/main" id="{7CBD3D4E-5D8A-4FF2-9E49-A53CCC7C533C}"/>
+                </a:ext>
+              </a:extLst>
+            </p:cNvPr>
+            <p:cNvSpPr txBox="1"/>
+            <p:nvPr/>
+          </p:nvSpPr>
+          <p:spPr>
+            <a:xfrm>
+              <a:off x="1223295" y="4129157"/>
+              <a:ext cx="6195927" cy="707886"/>
+            </a:xfrm>
+            <a:prstGeom prst="rect">
+              <a:avLst/>
+            </a:prstGeom>
             <a:noFill/>
-          </a:ln>
-          <a:effectLst>
-            <a:outerShdw blurRad="76200" dist="63500" dir="5040000" algn="tl" rotWithShape="0">
-              <a:srgbClr val="000000">
-                <a:alpha val="41000"/>
-              </a:srgbClr>
-            </a:outerShdw>
-          </a:effectLst>
-        </p:spPr>
-      </p:pic>
+          </p:spPr>
+          <p:txBody>
+            <a:bodyPr wrap="none" rtlCol="0">
+              <a:spAutoFit/>
+            </a:bodyPr>
+            <a:lstStyle/>
+            <a:p>
+              <a:r>
+                <a:rPr lang="en-US" sz="4000" b="1" dirty="0">
+                  <a:solidFill>
+                    <a:schemeClr val="tx1">
+                      <a:lumMod val="95000"/>
+                    </a:schemeClr>
+                  </a:solidFill>
+                  <a:latin typeface="Posterama" panose="020B0504020200020000" pitchFamily="34" charset="0"/>
+                  <a:cs typeface="Posterama" panose="020B0504020200020000" pitchFamily="34" charset="0"/>
+                </a:rPr>
+                <a:t>NEPTUNE CONSULTING</a:t>
+              </a:r>
+            </a:p>
+          </p:txBody>
+        </p:sp>
+      </p:grpSp>
     </p:spTree>
     <p:extLst>
       <p:ext uri="{BB962C8B-B14F-4D97-AF65-F5344CB8AC3E}">
@@ -11794,7 +13221,19 @@
           <a:p>
             <a:r>
               <a:rPr lang="en-US" dirty="0"/>
-              <a:t>Brand new Microsoft Studios requires a game plan for their initial run of movies. We examined what genres garner the greatest Return on Investment, evaluated the most and least popular genres, and looked at when movies were being released and have determined that Microsoft is best served by releasing Thrillers or Documentaries in late spring or at the very end of the year.</a:t>
+              <a:t>Examine what genres garner the greatest Return on Investment</a:t>
+            </a:r>
+          </a:p>
+          <a:p>
+            <a:r>
+              <a:rPr lang="en-US" dirty="0"/>
+              <a:t>Evaluate the most and least popular genres, </a:t>
+            </a:r>
+          </a:p>
+          <a:p>
+            <a:r>
+              <a:rPr lang="en-US" dirty="0"/>
+              <a:t>Determine when movies were being released</a:t>
             </a:r>
           </a:p>
         </p:txBody>

</xml_diff>